<commit_message>
Implementation of YOLO segmentation
</commit_message>
<xml_diff>
--- a/Fracture Bone Detection/BFD presentation.pptx
+++ b/Fracture Bone Detection/BFD presentation.pptx
@@ -10,6 +10,20 @@
     <p:sldId id="258" r:id="rId4"/>
     <p:sldId id="259" r:id="rId5"/>
     <p:sldId id="260" r:id="rId6"/>
+    <p:sldId id="263" r:id="rId7"/>
+    <p:sldId id="262" r:id="rId8"/>
+    <p:sldId id="261" r:id="rId9"/>
+    <p:sldId id="264" r:id="rId10"/>
+    <p:sldId id="265" r:id="rId11"/>
+    <p:sldId id="266" r:id="rId12"/>
+    <p:sldId id="267" r:id="rId13"/>
+    <p:sldId id="268" r:id="rId14"/>
+    <p:sldId id="269" r:id="rId15"/>
+    <p:sldId id="270" r:id="rId16"/>
+    <p:sldId id="271" r:id="rId17"/>
+    <p:sldId id="272" r:id="rId18"/>
+    <p:sldId id="273" r:id="rId19"/>
+    <p:sldId id="274" r:id="rId20"/>
   </p:sldIdLst>
   <p:sldSz cx="12192000" cy="6858000"/>
   <p:notesSz cx="6858000" cy="9144000"/>
@@ -124,58 +138,6 @@
 </p1510:revInfo>
 </file>
 
-<file path=ppt/changesInfos/changesInfo1.xml><?xml version="1.0" encoding="utf-8"?>
-<pc:chgInfo xmlns:a="http://schemas.openxmlformats.org/drawingml/2006/main" xmlns:r="http://schemas.openxmlformats.org/officeDocument/2006/relationships" xmlns:ac="http://schemas.microsoft.com/office/drawing/2013/main/command" xmlns:pc="http://schemas.microsoft.com/office/powerpoint/2013/main/command">
-  <pc:docChgLst>
-    <pc:chgData name="Joaquin Ayzanoa" userId="9a823615172c62e0" providerId="LiveId" clId="{93799D54-44C9-4CB3-B0F7-B5B7B46A988E}"/>
-    <pc:docChg chg="undo custSel modSld">
-      <pc:chgData name="Joaquin Ayzanoa" userId="9a823615172c62e0" providerId="LiveId" clId="{93799D54-44C9-4CB3-B0F7-B5B7B46A988E}" dt="2024-01-25T16:51:19.325" v="10" actId="20577"/>
-      <pc:docMkLst>
-        <pc:docMk/>
-      </pc:docMkLst>
-      <pc:sldChg chg="modSp mod">
-        <pc:chgData name="Joaquin Ayzanoa" userId="9a823615172c62e0" providerId="LiveId" clId="{93799D54-44C9-4CB3-B0F7-B5B7B46A988E}" dt="2024-01-25T16:40:36.951" v="6" actId="20577"/>
-        <pc:sldMkLst>
-          <pc:docMk/>
-          <pc:sldMk cId="206975319" sldId="258"/>
-        </pc:sldMkLst>
-        <pc:spChg chg="mod">
-          <ac:chgData name="Joaquin Ayzanoa" userId="9a823615172c62e0" providerId="LiveId" clId="{93799D54-44C9-4CB3-B0F7-B5B7B46A988E}" dt="2024-01-25T16:40:36.951" v="6" actId="20577"/>
-          <ac:spMkLst>
-            <pc:docMk/>
-            <pc:sldMk cId="206975319" sldId="258"/>
-            <ac:spMk id="7" creationId="{D73F1781-0D6B-82C4-3A81-100BF5A5FCB1}"/>
-          </ac:spMkLst>
-        </pc:spChg>
-      </pc:sldChg>
-      <pc:sldChg chg="addSp modSp mod">
-        <pc:chgData name="Joaquin Ayzanoa" userId="9a823615172c62e0" providerId="LiveId" clId="{93799D54-44C9-4CB3-B0F7-B5B7B46A988E}" dt="2024-01-25T16:51:19.325" v="10" actId="20577"/>
-        <pc:sldMkLst>
-          <pc:docMk/>
-          <pc:sldMk cId="2632297096" sldId="260"/>
-        </pc:sldMkLst>
-        <pc:spChg chg="mod">
-          <ac:chgData name="Joaquin Ayzanoa" userId="9a823615172c62e0" providerId="LiveId" clId="{93799D54-44C9-4CB3-B0F7-B5B7B46A988E}" dt="2024-01-25T16:51:19.325" v="10" actId="20577"/>
-          <ac:spMkLst>
-            <pc:docMk/>
-            <pc:sldMk cId="2632297096" sldId="260"/>
-            <ac:spMk id="7" creationId="{D73F1781-0D6B-82C4-3A81-100BF5A5FCB1}"/>
-          </ac:spMkLst>
-        </pc:spChg>
-        <pc:picChg chg="add mod">
-          <ac:chgData name="Joaquin Ayzanoa" userId="9a823615172c62e0" providerId="LiveId" clId="{93799D54-44C9-4CB3-B0F7-B5B7B46A988E}" dt="2024-01-25T16:40:41.478" v="8" actId="1076"/>
-          <ac:picMkLst>
-            <pc:docMk/>
-            <pc:sldMk cId="2632297096" sldId="260"/>
-            <ac:picMk id="1026" creationId="{B1D94EA9-5A29-A55F-679F-C868DFC3D874}"/>
-          </ac:picMkLst>
-        </pc:picChg>
-      </pc:sldChg>
-    </pc:docChg>
-  </pc:docChgLst>
-</pc:chgInfo>
-</file>
-
 <file path=ppt/slideLayouts/slideLayout1.xml><?xml version="1.0" encoding="utf-8"?>
 <p:sldLayout xmlns:a="http://schemas.openxmlformats.org/drawingml/2006/main" xmlns:r="http://schemas.openxmlformats.org/officeDocument/2006/relationships" xmlns:p="http://schemas.openxmlformats.org/presentationml/2006/main" showMasterSp="0" type="title" preserve="1">
   <p:cSld name="Title Slide">
@@ -385,7 +347,7 @@
           <a:p>
             <a:fld id="{C485584D-7D79-4248-9986-4CA35242F944}" type="datetimeFigureOut">
               <a:rPr lang="en-US" smtClean="0"/>
-              <a:t>1/25/2024</a:t>
+              <a:t>3/21/2024</a:t>
             </a:fld>
             <a:endParaRPr lang="en-US"/>
           </a:p>
@@ -759,7 +721,7 @@
           <a:p>
             <a:fld id="{C485584D-7D79-4248-9986-4CA35242F944}" type="datetimeFigureOut">
               <a:rPr lang="en-US" smtClean="0"/>
-              <a:t>1/25/2024</a:t>
+              <a:t>3/21/2024</a:t>
             </a:fld>
             <a:endParaRPr lang="en-US"/>
           </a:p>
@@ -969,7 +931,7 @@
           <a:p>
             <a:fld id="{C485584D-7D79-4248-9986-4CA35242F944}" type="datetimeFigureOut">
               <a:rPr lang="en-US" smtClean="0"/>
-              <a:t>1/25/2024</a:t>
+              <a:t>3/21/2024</a:t>
             </a:fld>
             <a:endParaRPr lang="en-US"/>
           </a:p>
@@ -1168,7 +1130,7 @@
           <a:p>
             <a:fld id="{C485584D-7D79-4248-9986-4CA35242F944}" type="datetimeFigureOut">
               <a:rPr lang="en-US" smtClean="0"/>
-              <a:t>1/25/2024</a:t>
+              <a:t>3/21/2024</a:t>
             </a:fld>
             <a:endParaRPr lang="en-US"/>
           </a:p>
@@ -1281,7 +1243,7 @@
           <a:p>
             <a:fld id="{C485584D-7D79-4248-9986-4CA35242F944}" type="datetimeFigureOut">
               <a:rPr lang="en-US" smtClean="0"/>
-              <a:t>1/25/2024</a:t>
+              <a:t>3/21/2024</a:t>
             </a:fld>
             <a:endParaRPr lang="en-US"/>
           </a:p>
@@ -2017,7 +1979,7 @@
           <a:p>
             <a:fld id="{C485584D-7D79-4248-9986-4CA35242F944}" type="datetimeFigureOut">
               <a:rPr lang="en-US" smtClean="0"/>
-              <a:t>1/25/2024</a:t>
+              <a:t>3/21/2024</a:t>
             </a:fld>
             <a:endParaRPr lang="en-US"/>
           </a:p>
@@ -2433,7 +2395,7 @@
           <a:p>
             <a:fld id="{C485584D-7D79-4248-9986-4CA35242F944}" type="datetimeFigureOut">
               <a:rPr lang="en-US" smtClean="0"/>
-              <a:t>1/25/2024</a:t>
+              <a:t>3/21/2024</a:t>
             </a:fld>
             <a:endParaRPr lang="en-US"/>
           </a:p>
@@ -2574,7 +2536,7 @@
           <a:p>
             <a:fld id="{C485584D-7D79-4248-9986-4CA35242F944}" type="datetimeFigureOut">
               <a:rPr lang="en-US" smtClean="0"/>
-              <a:t>1/25/2024</a:t>
+              <a:t>3/21/2024</a:t>
             </a:fld>
             <a:endParaRPr lang="en-US"/>
           </a:p>
@@ -2687,7 +2649,7 @@
           <a:p>
             <a:fld id="{C485584D-7D79-4248-9986-4CA35242F944}" type="datetimeFigureOut">
               <a:rPr lang="en-US" smtClean="0"/>
-              <a:t>1/25/2024</a:t>
+              <a:t>3/21/2024</a:t>
             </a:fld>
             <a:endParaRPr lang="en-US"/>
           </a:p>
@@ -3000,7 +2962,7 @@
           <a:p>
             <a:fld id="{C485584D-7D79-4248-9986-4CA35242F944}" type="datetimeFigureOut">
               <a:rPr lang="en-US" smtClean="0"/>
-              <a:t>1/25/2024</a:t>
+              <a:t>3/21/2024</a:t>
             </a:fld>
             <a:endParaRPr lang="en-US"/>
           </a:p>
@@ -3292,7 +3254,7 @@
           <a:p>
             <a:fld id="{C485584D-7D79-4248-9986-4CA35242F944}" type="datetimeFigureOut">
               <a:rPr lang="en-US" smtClean="0"/>
-              <a:t>1/25/2024</a:t>
+              <a:t>3/21/2024</a:t>
             </a:fld>
             <a:endParaRPr lang="en-US"/>
           </a:p>
@@ -3576,7 +3538,7 @@
           <a:p>
             <a:fld id="{C485584D-7D79-4248-9986-4CA35242F944}" type="datetimeFigureOut">
               <a:rPr lang="en-US" smtClean="0"/>
-              <a:t>1/25/2024</a:t>
+              <a:t>3/21/2024</a:t>
             </a:fld>
             <a:endParaRPr lang="en-US"/>
           </a:p>
@@ -4655,6 +4617,2622 @@
 </p:sld>
 </file>
 
+<file path=ppt/slides/slide10.xml><?xml version="1.0" encoding="utf-8"?>
+<p:sld xmlns:a="http://schemas.openxmlformats.org/drawingml/2006/main" xmlns:r="http://schemas.openxmlformats.org/officeDocument/2006/relationships" xmlns:p="http://schemas.openxmlformats.org/presentationml/2006/main">
+  <p:cSld>
+    <p:spTree>
+      <p:nvGrpSpPr>
+        <p:cNvPr id="1" name=""/>
+        <p:cNvGrpSpPr/>
+        <p:nvPr/>
+      </p:nvGrpSpPr>
+      <p:grpSpPr>
+        <a:xfrm>
+          <a:off x="0" y="0"/>
+          <a:ext cx="0" cy="0"/>
+          <a:chOff x="0" y="0"/>
+          <a:chExt cx="0" cy="0"/>
+        </a:xfrm>
+      </p:grpSpPr>
+      <p:pic>
+        <p:nvPicPr>
+          <p:cNvPr id="6" name="Picture 3" descr="Una red de puntos conectados">
+            <a:extLst>
+              <a:ext uri="{FF2B5EF4-FFF2-40B4-BE49-F238E27FC236}">
+                <a16:creationId xmlns:a16="http://schemas.microsoft.com/office/drawing/2014/main" id="{4EC5ED6C-92B5-57B7-9EC6-E40C78E878D0}"/>
+              </a:ext>
+            </a:extLst>
+          </p:cNvPr>
+          <p:cNvPicPr>
+            <a:picLocks noChangeAspect="1"/>
+          </p:cNvPicPr>
+          <p:nvPr/>
+        </p:nvPicPr>
+        <p:blipFill rotWithShape="1">
+          <a:blip r:embed="rId2">
+            <a:alphaModFix amt="20000"/>
+          </a:blip>
+          <a:srcRect l="20444" b="2030"/>
+          <a:stretch/>
+        </p:blipFill>
+        <p:spPr>
+          <a:xfrm>
+            <a:off x="163114" y="159505"/>
+            <a:ext cx="11865771" cy="6538989"/>
+          </a:xfrm>
+          <a:prstGeom prst="rect">
+            <a:avLst/>
+          </a:prstGeom>
+        </p:spPr>
+      </p:pic>
+      <p:sp>
+        <p:nvSpPr>
+          <p:cNvPr id="2" name="Título 1">
+            <a:extLst>
+              <a:ext uri="{FF2B5EF4-FFF2-40B4-BE49-F238E27FC236}">
+                <a16:creationId xmlns:a16="http://schemas.microsoft.com/office/drawing/2014/main" id="{AC62C56E-7B68-12F5-81B2-857F91BD8380}"/>
+              </a:ext>
+            </a:extLst>
+          </p:cNvPr>
+          <p:cNvSpPr>
+            <a:spLocks noGrp="1"/>
+          </p:cNvSpPr>
+          <p:nvPr>
+            <p:ph type="title"/>
+          </p:nvPr>
+        </p:nvSpPr>
+        <p:spPr>
+          <a:xfrm>
+            <a:off x="537068" y="472366"/>
+            <a:ext cx="10134600" cy="828675"/>
+          </a:xfrm>
+        </p:spPr>
+        <p:txBody>
+          <a:bodyPr>
+            <a:normAutofit fontScale="90000"/>
+          </a:bodyPr>
+          <a:lstStyle/>
+          <a:p>
+            <a:r>
+              <a:rPr lang="es-PE" sz="4400" dirty="0">
+                <a:solidFill>
+                  <a:schemeClr val="tx1"/>
+                </a:solidFill>
+              </a:rPr>
+              <a:t>6. YOLO-V8 FOR OBJECT DETECTION</a:t>
+            </a:r>
+          </a:p>
+        </p:txBody>
+      </p:sp>
+      <p:pic>
+        <p:nvPicPr>
+          <p:cNvPr id="5" name="Marcador de contenido 4" descr="Un dibujo de un coral&#10;&#10;Descripción generada automáticamente con confianza baja">
+            <a:extLst>
+              <a:ext uri="{FF2B5EF4-FFF2-40B4-BE49-F238E27FC236}">
+                <a16:creationId xmlns:a16="http://schemas.microsoft.com/office/drawing/2014/main" id="{E3C00AE9-27E6-5665-8587-386367E3FBEE}"/>
+              </a:ext>
+            </a:extLst>
+          </p:cNvPr>
+          <p:cNvPicPr>
+            <a:picLocks noGrp="1" noChangeAspect="1"/>
+          </p:cNvPicPr>
+          <p:nvPr>
+            <p:ph idx="1"/>
+          </p:nvPr>
+        </p:nvPicPr>
+        <p:blipFill>
+          <a:blip r:embed="rId3">
+            <a:alphaModFix amt="50000"/>
+            <a:extLst>
+              <a:ext uri="{28A0092B-C50C-407E-A947-70E740481C1C}">
+                <a14:useLocalDpi xmlns:a14="http://schemas.microsoft.com/office/drawing/2010/main" val="0"/>
+              </a:ext>
+            </a:extLst>
+          </a:blip>
+          <a:stretch>
+            <a:fillRect/>
+          </a:stretch>
+        </p:blipFill>
+        <p:spPr>
+          <a:xfrm>
+            <a:off x="9406229" y="3890838"/>
+            <a:ext cx="2530878" cy="3129087"/>
+          </a:xfrm>
+        </p:spPr>
+      </p:pic>
+      <p:sp>
+        <p:nvSpPr>
+          <p:cNvPr id="16" name="CuadroTexto 15">
+            <a:extLst>
+              <a:ext uri="{FF2B5EF4-FFF2-40B4-BE49-F238E27FC236}">
+                <a16:creationId xmlns:a16="http://schemas.microsoft.com/office/drawing/2014/main" id="{90EB6D43-5F05-6D1B-1027-12C72286531F}"/>
+              </a:ext>
+            </a:extLst>
+          </p:cNvPr>
+          <p:cNvSpPr txBox="1"/>
+          <p:nvPr/>
+        </p:nvSpPr>
+        <p:spPr>
+          <a:xfrm>
+            <a:off x="946643" y="1377953"/>
+            <a:ext cx="9725025" cy="646331"/>
+          </a:xfrm>
+          <a:prstGeom prst="rect">
+            <a:avLst/>
+          </a:prstGeom>
+          <a:noFill/>
+        </p:spPr>
+        <p:txBody>
+          <a:bodyPr wrap="square" rtlCol="0">
+            <a:spAutoFit/>
+          </a:bodyPr>
+          <a:lstStyle/>
+          <a:p>
+            <a:r>
+              <a:rPr lang="es-PE" dirty="0" err="1"/>
+              <a:t>The</a:t>
+            </a:r>
+            <a:r>
+              <a:rPr lang="es-PE" dirty="0"/>
+              <a:t> YoloV8 </a:t>
+            </a:r>
+            <a:r>
+              <a:rPr lang="es-PE" dirty="0" err="1"/>
+              <a:t>model</a:t>
+            </a:r>
+            <a:r>
+              <a:rPr lang="es-PE" dirty="0"/>
+              <a:t> </a:t>
+            </a:r>
+            <a:r>
+              <a:rPr lang="es-PE" dirty="0" err="1"/>
+              <a:t>is</a:t>
+            </a:r>
+            <a:r>
+              <a:rPr lang="es-PE" dirty="0"/>
+              <a:t> a </a:t>
+            </a:r>
+            <a:r>
+              <a:rPr lang="es-PE" dirty="0" err="1"/>
+              <a:t>pretrained</a:t>
+            </a:r>
+            <a:r>
+              <a:rPr lang="es-PE" dirty="0"/>
+              <a:t> </a:t>
+            </a:r>
+            <a:r>
+              <a:rPr lang="es-PE" dirty="0" err="1"/>
+              <a:t>model</a:t>
+            </a:r>
+            <a:r>
+              <a:rPr lang="es-PE" dirty="0"/>
+              <a:t> </a:t>
+            </a:r>
+            <a:r>
+              <a:rPr lang="es-PE" dirty="0" err="1"/>
+              <a:t>downloaded</a:t>
+            </a:r>
+            <a:r>
+              <a:rPr lang="es-PE" dirty="0"/>
+              <a:t> </a:t>
+            </a:r>
+            <a:r>
+              <a:rPr lang="es-PE" dirty="0" err="1"/>
+              <a:t>from</a:t>
+            </a:r>
+            <a:r>
+              <a:rPr lang="es-PE" dirty="0"/>
+              <a:t> </a:t>
+            </a:r>
+            <a:r>
+              <a:rPr lang="es-PE" dirty="0" err="1"/>
+              <a:t>the</a:t>
+            </a:r>
+            <a:r>
+              <a:rPr lang="es-PE" dirty="0"/>
+              <a:t> </a:t>
+            </a:r>
+            <a:r>
+              <a:rPr lang="es-PE" dirty="0" err="1"/>
+              <a:t>library</a:t>
+            </a:r>
+            <a:r>
+              <a:rPr lang="es-PE" dirty="0"/>
+              <a:t> “</a:t>
+            </a:r>
+            <a:r>
+              <a:rPr lang="es-PE" dirty="0" err="1"/>
+              <a:t>Ultralytics</a:t>
+            </a:r>
+            <a:r>
+              <a:rPr lang="es-PE" dirty="0"/>
+              <a:t>”.</a:t>
+            </a:r>
+          </a:p>
+          <a:p>
+            <a:r>
+              <a:rPr lang="es-PE" dirty="0" err="1"/>
+              <a:t>The</a:t>
+            </a:r>
+            <a:r>
+              <a:rPr lang="es-PE" dirty="0"/>
+              <a:t> YoloV8 </a:t>
+            </a:r>
+            <a:r>
+              <a:rPr lang="es-PE" dirty="0" err="1"/>
+              <a:t>was</a:t>
+            </a:r>
+            <a:r>
+              <a:rPr lang="es-PE" dirty="0"/>
+              <a:t> </a:t>
+            </a:r>
+            <a:r>
+              <a:rPr lang="es-PE" dirty="0" err="1"/>
+              <a:t>finetuned</a:t>
+            </a:r>
+            <a:r>
+              <a:rPr lang="es-PE" dirty="0"/>
+              <a:t> </a:t>
+            </a:r>
+            <a:r>
+              <a:rPr lang="es-PE" dirty="0" err="1"/>
+              <a:t>to</a:t>
+            </a:r>
+            <a:r>
+              <a:rPr lang="es-PE" dirty="0"/>
+              <a:t> </a:t>
+            </a:r>
+            <a:r>
+              <a:rPr lang="es-PE" dirty="0" err="1"/>
+              <a:t>bone</a:t>
+            </a:r>
+            <a:r>
+              <a:rPr lang="es-PE" dirty="0"/>
+              <a:t> fracture </a:t>
+            </a:r>
+            <a:r>
+              <a:rPr lang="es-PE" dirty="0" err="1"/>
+              <a:t>detection</a:t>
+            </a:r>
+            <a:r>
+              <a:rPr lang="es-PE" dirty="0"/>
+              <a:t> </a:t>
+            </a:r>
+            <a:r>
+              <a:rPr lang="es-PE" dirty="0" err="1"/>
+              <a:t>task</a:t>
+            </a:r>
+            <a:r>
+              <a:rPr lang="es-PE" dirty="0"/>
+              <a:t>.  </a:t>
+            </a:r>
+          </a:p>
+        </p:txBody>
+      </p:sp>
+      <p:sp>
+        <p:nvSpPr>
+          <p:cNvPr id="4" name="Rectangle 2">
+            <a:extLst>
+              <a:ext uri="{FF2B5EF4-FFF2-40B4-BE49-F238E27FC236}">
+                <a16:creationId xmlns:a16="http://schemas.microsoft.com/office/drawing/2014/main" id="{8A15156B-7E92-89CD-6719-A9503045E116}"/>
+              </a:ext>
+            </a:extLst>
+          </p:cNvPr>
+          <p:cNvSpPr>
+            <a:spLocks noChangeArrowheads="1"/>
+          </p:cNvSpPr>
+          <p:nvPr/>
+        </p:nvSpPr>
+        <p:spPr bwMode="auto">
+          <a:xfrm>
+            <a:off x="0" y="0"/>
+            <a:ext cx="12192000" cy="457200"/>
+          </a:xfrm>
+          <a:prstGeom prst="rect">
+            <a:avLst/>
+          </a:prstGeom>
+          <a:noFill/>
+          <a:ln>
+            <a:noFill/>
+          </a:ln>
+          <a:effectLst/>
+          <a:extLst>
+            <a:ext uri="{909E8E84-426E-40DD-AFC4-6F175D3DCCD1}">
+              <a14:hiddenFill xmlns:a14="http://schemas.microsoft.com/office/drawing/2010/main">
+                <a:solidFill>
+                  <a:schemeClr val="accent1"/>
+                </a:solidFill>
+              </a14:hiddenFill>
+            </a:ext>
+            <a:ext uri="{91240B29-F687-4F45-9708-019B960494DF}">
+              <a14:hiddenLine xmlns:a14="http://schemas.microsoft.com/office/drawing/2010/main" w="9525">
+                <a:solidFill>
+                  <a:schemeClr val="tx1"/>
+                </a:solidFill>
+                <a:miter lim="800000"/>
+                <a:headEnd/>
+                <a:tailEnd/>
+              </a14:hiddenLine>
+            </a:ext>
+            <a:ext uri="{AF507438-7753-43E0-B8FC-AC1667EBCBE1}">
+              <a14:hiddenEffects xmlns:a14="http://schemas.microsoft.com/office/drawing/2010/main">
+                <a:effectLst>
+                  <a:outerShdw dist="35921" dir="2700000" algn="ctr" rotWithShape="0">
+                    <a:schemeClr val="bg2"/>
+                  </a:outerShdw>
+                </a:effectLst>
+              </a14:hiddenEffects>
+            </a:ext>
+          </a:extLst>
+        </p:spPr>
+        <p:txBody>
+          <a:bodyPr vert="horz" wrap="none" lIns="0" tIns="0" rIns="0" bIns="0" numCol="1" anchor="ctr" anchorCtr="0" compatLnSpc="1">
+            <a:prstTxWarp prst="textNoShape">
+              <a:avLst/>
+            </a:prstTxWarp>
+            <a:spAutoFit/>
+          </a:bodyPr>
+          <a:lstStyle/>
+          <a:p>
+            <a:pPr marL="0" marR="0" lvl="0" indent="0" algn="l" defTabSz="914400" rtl="0" eaLnBrk="0" fontAlgn="base" latinLnBrk="0" hangingPunct="0">
+              <a:lnSpc>
+                <a:spcPct val="100000"/>
+              </a:lnSpc>
+              <a:spcBef>
+                <a:spcPct val="0"/>
+              </a:spcBef>
+              <a:spcAft>
+                <a:spcPct val="0"/>
+              </a:spcAft>
+              <a:buClrTx/>
+              <a:buSzTx/>
+              <a:buFontTx/>
+              <a:buNone/>
+              <a:tabLst/>
+            </a:pPr>
+            <a:r>
+              <a:rPr kumimoji="0" lang="es-PE" altLang="es-PE" sz="1000" b="0" i="0" u="none" strike="noStrike" cap="none" normalizeH="0" baseline="0">
+                <a:ln>
+                  <a:noFill/>
+                </a:ln>
+                <a:solidFill>
+                  <a:srgbClr val="E6EDF3"/>
+                </a:solidFill>
+                <a:effectLst/>
+                <a:latin typeface="ui-monospace"/>
+              </a:rPr>
+              <a:t>ultralytics</a:t>
+            </a:r>
+            <a:r>
+              <a:rPr kumimoji="0" lang="es-PE" altLang="es-PE" sz="800" b="0" i="0" u="none" strike="noStrike" cap="none" normalizeH="0" baseline="0">
+                <a:ln>
+                  <a:noFill/>
+                </a:ln>
+                <a:solidFill>
+                  <a:schemeClr val="tx1"/>
+                </a:solidFill>
+                <a:effectLst/>
+              </a:rPr>
+              <a:t> </a:t>
+            </a:r>
+            <a:endParaRPr kumimoji="0" lang="es-PE" altLang="es-PE" sz="1800" b="0" i="0" u="none" strike="noStrike" cap="none" normalizeH="0" baseline="0">
+              <a:ln>
+                <a:noFill/>
+              </a:ln>
+              <a:solidFill>
+                <a:schemeClr val="tx1"/>
+              </a:solidFill>
+              <a:effectLst/>
+              <a:latin typeface="Arial" panose="020B0604020202020204" pitchFamily="34" charset="0"/>
+            </a:endParaRPr>
+          </a:p>
+        </p:txBody>
+      </p:sp>
+      <p:pic>
+        <p:nvPicPr>
+          <p:cNvPr id="9" name="Imagen 8">
+            <a:extLst>
+              <a:ext uri="{FF2B5EF4-FFF2-40B4-BE49-F238E27FC236}">
+                <a16:creationId xmlns:a16="http://schemas.microsoft.com/office/drawing/2014/main" id="{6FEC6AA6-EDC6-3198-6BCF-3252FD7792E9}"/>
+              </a:ext>
+            </a:extLst>
+          </p:cNvPr>
+          <p:cNvPicPr>
+            <a:picLocks noChangeAspect="1"/>
+          </p:cNvPicPr>
+          <p:nvPr/>
+        </p:nvPicPr>
+        <p:blipFill>
+          <a:blip r:embed="rId4"/>
+          <a:stretch>
+            <a:fillRect/>
+          </a:stretch>
+        </p:blipFill>
+        <p:spPr>
+          <a:xfrm>
+            <a:off x="2885641" y="1989499"/>
+            <a:ext cx="5847027" cy="4697400"/>
+          </a:xfrm>
+          <a:prstGeom prst="rect">
+            <a:avLst/>
+          </a:prstGeom>
+        </p:spPr>
+      </p:pic>
+    </p:spTree>
+    <p:extLst>
+      <p:ext uri="{BB962C8B-B14F-4D97-AF65-F5344CB8AC3E}">
+        <p14:creationId xmlns:p14="http://schemas.microsoft.com/office/powerpoint/2010/main" val="1071850512"/>
+      </p:ext>
+    </p:extLst>
+  </p:cSld>
+  <p:clrMapOvr>
+    <a:masterClrMapping/>
+  </p:clrMapOvr>
+</p:sld>
+</file>
+
+<file path=ppt/slides/slide11.xml><?xml version="1.0" encoding="utf-8"?>
+<p:sld xmlns:a="http://schemas.openxmlformats.org/drawingml/2006/main" xmlns:r="http://schemas.openxmlformats.org/officeDocument/2006/relationships" xmlns:p="http://schemas.openxmlformats.org/presentationml/2006/main">
+  <p:cSld>
+    <p:spTree>
+      <p:nvGrpSpPr>
+        <p:cNvPr id="1" name=""/>
+        <p:cNvGrpSpPr/>
+        <p:nvPr/>
+      </p:nvGrpSpPr>
+      <p:grpSpPr>
+        <a:xfrm>
+          <a:off x="0" y="0"/>
+          <a:ext cx="0" cy="0"/>
+          <a:chOff x="0" y="0"/>
+          <a:chExt cx="0" cy="0"/>
+        </a:xfrm>
+      </p:grpSpPr>
+      <p:pic>
+        <p:nvPicPr>
+          <p:cNvPr id="6" name="Picture 3" descr="Una red de puntos conectados">
+            <a:extLst>
+              <a:ext uri="{FF2B5EF4-FFF2-40B4-BE49-F238E27FC236}">
+                <a16:creationId xmlns:a16="http://schemas.microsoft.com/office/drawing/2014/main" id="{4EC5ED6C-92B5-57B7-9EC6-E40C78E878D0}"/>
+              </a:ext>
+            </a:extLst>
+          </p:cNvPr>
+          <p:cNvPicPr>
+            <a:picLocks noChangeAspect="1"/>
+          </p:cNvPicPr>
+          <p:nvPr/>
+        </p:nvPicPr>
+        <p:blipFill rotWithShape="1">
+          <a:blip r:embed="rId2">
+            <a:alphaModFix amt="20000"/>
+          </a:blip>
+          <a:srcRect l="20444" b="2030"/>
+          <a:stretch/>
+        </p:blipFill>
+        <p:spPr>
+          <a:xfrm>
+            <a:off x="163114" y="159505"/>
+            <a:ext cx="11865771" cy="6538989"/>
+          </a:xfrm>
+          <a:prstGeom prst="rect">
+            <a:avLst/>
+          </a:prstGeom>
+        </p:spPr>
+      </p:pic>
+      <p:sp>
+        <p:nvSpPr>
+          <p:cNvPr id="2" name="Título 1">
+            <a:extLst>
+              <a:ext uri="{FF2B5EF4-FFF2-40B4-BE49-F238E27FC236}">
+                <a16:creationId xmlns:a16="http://schemas.microsoft.com/office/drawing/2014/main" id="{AC62C56E-7B68-12F5-81B2-857F91BD8380}"/>
+              </a:ext>
+            </a:extLst>
+          </p:cNvPr>
+          <p:cNvSpPr>
+            <a:spLocks noGrp="1"/>
+          </p:cNvSpPr>
+          <p:nvPr>
+            <p:ph type="title"/>
+          </p:nvPr>
+        </p:nvSpPr>
+        <p:spPr>
+          <a:xfrm>
+            <a:off x="537068" y="461115"/>
+            <a:ext cx="10134600" cy="828675"/>
+          </a:xfrm>
+        </p:spPr>
+        <p:txBody>
+          <a:bodyPr>
+            <a:normAutofit/>
+          </a:bodyPr>
+          <a:lstStyle/>
+          <a:p>
+            <a:r>
+              <a:rPr lang="es-PE" sz="4400" dirty="0">
+                <a:solidFill>
+                  <a:schemeClr val="tx1"/>
+                </a:solidFill>
+              </a:rPr>
+              <a:t>6.1 </a:t>
+            </a:r>
+            <a:r>
+              <a:rPr lang="es-PE" sz="4400" dirty="0" err="1">
+                <a:solidFill>
+                  <a:schemeClr val="tx1"/>
+                </a:solidFill>
+              </a:rPr>
+              <a:t>Results</a:t>
+            </a:r>
+            <a:endParaRPr lang="es-PE" sz="4400" dirty="0">
+              <a:solidFill>
+                <a:schemeClr val="tx1"/>
+              </a:solidFill>
+            </a:endParaRPr>
+          </a:p>
+        </p:txBody>
+      </p:sp>
+      <p:pic>
+        <p:nvPicPr>
+          <p:cNvPr id="5" name="Marcador de contenido 4" descr="Un dibujo de un coral&#10;&#10;Descripción generada automáticamente con confianza baja">
+            <a:extLst>
+              <a:ext uri="{FF2B5EF4-FFF2-40B4-BE49-F238E27FC236}">
+                <a16:creationId xmlns:a16="http://schemas.microsoft.com/office/drawing/2014/main" id="{E3C00AE9-27E6-5665-8587-386367E3FBEE}"/>
+              </a:ext>
+            </a:extLst>
+          </p:cNvPr>
+          <p:cNvPicPr>
+            <a:picLocks noGrp="1" noChangeAspect="1"/>
+          </p:cNvPicPr>
+          <p:nvPr>
+            <p:ph idx="1"/>
+          </p:nvPr>
+        </p:nvPicPr>
+        <p:blipFill>
+          <a:blip r:embed="rId3">
+            <a:alphaModFix amt="50000"/>
+            <a:extLst>
+              <a:ext uri="{28A0092B-C50C-407E-A947-70E740481C1C}">
+                <a14:useLocalDpi xmlns:a14="http://schemas.microsoft.com/office/drawing/2010/main" val="0"/>
+              </a:ext>
+            </a:extLst>
+          </a:blip>
+          <a:stretch>
+            <a:fillRect/>
+          </a:stretch>
+        </p:blipFill>
+        <p:spPr>
+          <a:xfrm>
+            <a:off x="9406229" y="3890838"/>
+            <a:ext cx="2530878" cy="3129087"/>
+          </a:xfrm>
+        </p:spPr>
+      </p:pic>
+      <p:pic>
+        <p:nvPicPr>
+          <p:cNvPr id="7" name="Imagen 6" descr="Gráfico, Gráfico de dispersión&#10;&#10;Descripción generada automáticamente">
+            <a:extLst>
+              <a:ext uri="{FF2B5EF4-FFF2-40B4-BE49-F238E27FC236}">
+                <a16:creationId xmlns:a16="http://schemas.microsoft.com/office/drawing/2014/main" id="{79CF0624-E1FA-9097-1BF1-1C2F83339AEC}"/>
+              </a:ext>
+            </a:extLst>
+          </p:cNvPr>
+          <p:cNvPicPr>
+            <a:picLocks noChangeAspect="1"/>
+          </p:cNvPicPr>
+          <p:nvPr/>
+        </p:nvPicPr>
+        <p:blipFill>
+          <a:blip r:embed="rId4">
+            <a:extLst>
+              <a:ext uri="{28A0092B-C50C-407E-A947-70E740481C1C}">
+                <a14:useLocalDpi xmlns:a14="http://schemas.microsoft.com/office/drawing/2010/main" val="0"/>
+              </a:ext>
+            </a:extLst>
+          </a:blip>
+          <a:stretch>
+            <a:fillRect/>
+          </a:stretch>
+        </p:blipFill>
+        <p:spPr>
+          <a:xfrm>
+            <a:off x="1333499" y="1425820"/>
+            <a:ext cx="9860069" cy="4930035"/>
+          </a:xfrm>
+          <a:prstGeom prst="rect">
+            <a:avLst/>
+          </a:prstGeom>
+        </p:spPr>
+      </p:pic>
+    </p:spTree>
+    <p:extLst>
+      <p:ext uri="{BB962C8B-B14F-4D97-AF65-F5344CB8AC3E}">
+        <p14:creationId xmlns:p14="http://schemas.microsoft.com/office/powerpoint/2010/main" val="487859956"/>
+      </p:ext>
+    </p:extLst>
+  </p:cSld>
+  <p:clrMapOvr>
+    <a:masterClrMapping/>
+  </p:clrMapOvr>
+</p:sld>
+</file>
+
+<file path=ppt/slides/slide12.xml><?xml version="1.0" encoding="utf-8"?>
+<p:sld xmlns:a="http://schemas.openxmlformats.org/drawingml/2006/main" xmlns:r="http://schemas.openxmlformats.org/officeDocument/2006/relationships" xmlns:p="http://schemas.openxmlformats.org/presentationml/2006/main">
+  <p:cSld>
+    <p:spTree>
+      <p:nvGrpSpPr>
+        <p:cNvPr id="1" name=""/>
+        <p:cNvGrpSpPr/>
+        <p:nvPr/>
+      </p:nvGrpSpPr>
+      <p:grpSpPr>
+        <a:xfrm>
+          <a:off x="0" y="0"/>
+          <a:ext cx="0" cy="0"/>
+          <a:chOff x="0" y="0"/>
+          <a:chExt cx="0" cy="0"/>
+        </a:xfrm>
+      </p:grpSpPr>
+      <p:pic>
+        <p:nvPicPr>
+          <p:cNvPr id="6" name="Picture 3" descr="Una red de puntos conectados">
+            <a:extLst>
+              <a:ext uri="{FF2B5EF4-FFF2-40B4-BE49-F238E27FC236}">
+                <a16:creationId xmlns:a16="http://schemas.microsoft.com/office/drawing/2014/main" id="{4EC5ED6C-92B5-57B7-9EC6-E40C78E878D0}"/>
+              </a:ext>
+            </a:extLst>
+          </p:cNvPr>
+          <p:cNvPicPr>
+            <a:picLocks noChangeAspect="1"/>
+          </p:cNvPicPr>
+          <p:nvPr/>
+        </p:nvPicPr>
+        <p:blipFill rotWithShape="1">
+          <a:blip r:embed="rId2">
+            <a:alphaModFix amt="20000"/>
+          </a:blip>
+          <a:srcRect l="20444" b="2030"/>
+          <a:stretch/>
+        </p:blipFill>
+        <p:spPr>
+          <a:xfrm>
+            <a:off x="163114" y="159505"/>
+            <a:ext cx="11865771" cy="6538989"/>
+          </a:xfrm>
+          <a:prstGeom prst="rect">
+            <a:avLst/>
+          </a:prstGeom>
+        </p:spPr>
+      </p:pic>
+      <p:sp>
+        <p:nvSpPr>
+          <p:cNvPr id="2" name="Título 1">
+            <a:extLst>
+              <a:ext uri="{FF2B5EF4-FFF2-40B4-BE49-F238E27FC236}">
+                <a16:creationId xmlns:a16="http://schemas.microsoft.com/office/drawing/2014/main" id="{AC62C56E-7B68-12F5-81B2-857F91BD8380}"/>
+              </a:ext>
+            </a:extLst>
+          </p:cNvPr>
+          <p:cNvSpPr>
+            <a:spLocks noGrp="1"/>
+          </p:cNvSpPr>
+          <p:nvPr>
+            <p:ph type="title"/>
+          </p:nvPr>
+        </p:nvSpPr>
+        <p:spPr>
+          <a:xfrm>
+            <a:off x="537068" y="461115"/>
+            <a:ext cx="10134600" cy="828675"/>
+          </a:xfrm>
+        </p:spPr>
+        <p:txBody>
+          <a:bodyPr>
+            <a:normAutofit/>
+          </a:bodyPr>
+          <a:lstStyle/>
+          <a:p>
+            <a:r>
+              <a:rPr lang="es-PE" sz="4400" dirty="0">
+                <a:solidFill>
+                  <a:schemeClr val="tx1"/>
+                </a:solidFill>
+              </a:rPr>
+              <a:t>6.1 </a:t>
+            </a:r>
+            <a:r>
+              <a:rPr lang="es-PE" sz="4400" dirty="0" err="1">
+                <a:solidFill>
+                  <a:schemeClr val="tx1"/>
+                </a:solidFill>
+              </a:rPr>
+              <a:t>Results</a:t>
+            </a:r>
+            <a:endParaRPr lang="es-PE" sz="4400" dirty="0">
+              <a:solidFill>
+                <a:schemeClr val="tx1"/>
+              </a:solidFill>
+            </a:endParaRPr>
+          </a:p>
+        </p:txBody>
+      </p:sp>
+      <p:pic>
+        <p:nvPicPr>
+          <p:cNvPr id="5" name="Marcador de contenido 4" descr="Un dibujo de un coral&#10;&#10;Descripción generada automáticamente con confianza baja">
+            <a:extLst>
+              <a:ext uri="{FF2B5EF4-FFF2-40B4-BE49-F238E27FC236}">
+                <a16:creationId xmlns:a16="http://schemas.microsoft.com/office/drawing/2014/main" id="{E3C00AE9-27E6-5665-8587-386367E3FBEE}"/>
+              </a:ext>
+            </a:extLst>
+          </p:cNvPr>
+          <p:cNvPicPr>
+            <a:picLocks noGrp="1" noChangeAspect="1"/>
+          </p:cNvPicPr>
+          <p:nvPr>
+            <p:ph idx="1"/>
+          </p:nvPr>
+        </p:nvPicPr>
+        <p:blipFill>
+          <a:blip r:embed="rId3">
+            <a:alphaModFix amt="50000"/>
+            <a:extLst>
+              <a:ext uri="{28A0092B-C50C-407E-A947-70E740481C1C}">
+                <a14:useLocalDpi xmlns:a14="http://schemas.microsoft.com/office/drawing/2010/main" val="0"/>
+              </a:ext>
+            </a:extLst>
+          </a:blip>
+          <a:stretch>
+            <a:fillRect/>
+          </a:stretch>
+        </p:blipFill>
+        <p:spPr>
+          <a:xfrm>
+            <a:off x="9406229" y="3890838"/>
+            <a:ext cx="2530878" cy="3129087"/>
+          </a:xfrm>
+        </p:spPr>
+      </p:pic>
+      <p:pic>
+        <p:nvPicPr>
+          <p:cNvPr id="4" name="Imagen 3" descr="Gráfico, Histograma&#10;&#10;Descripción generada automáticamente">
+            <a:extLst>
+              <a:ext uri="{FF2B5EF4-FFF2-40B4-BE49-F238E27FC236}">
+                <a16:creationId xmlns:a16="http://schemas.microsoft.com/office/drawing/2014/main" id="{F7C90238-7772-894D-FA5B-B70998E52E3C}"/>
+              </a:ext>
+            </a:extLst>
+          </p:cNvPr>
+          <p:cNvPicPr>
+            <a:picLocks noChangeAspect="1"/>
+          </p:cNvPicPr>
+          <p:nvPr/>
+        </p:nvPicPr>
+        <p:blipFill>
+          <a:blip r:embed="rId4">
+            <a:extLst>
+              <a:ext uri="{28A0092B-C50C-407E-A947-70E740481C1C}">
+                <a14:useLocalDpi xmlns:a14="http://schemas.microsoft.com/office/drawing/2010/main" val="0"/>
+              </a:ext>
+            </a:extLst>
+          </a:blip>
+          <a:stretch>
+            <a:fillRect/>
+          </a:stretch>
+        </p:blipFill>
+        <p:spPr>
+          <a:xfrm>
+            <a:off x="6282976" y="1835350"/>
+            <a:ext cx="5198156" cy="3465437"/>
+          </a:xfrm>
+          <a:prstGeom prst="rect">
+            <a:avLst/>
+          </a:prstGeom>
+        </p:spPr>
+      </p:pic>
+      <p:pic>
+        <p:nvPicPr>
+          <p:cNvPr id="9" name="Imagen 8" descr="Gráfico&#10;&#10;Descripción generada automáticamente">
+            <a:extLst>
+              <a:ext uri="{FF2B5EF4-FFF2-40B4-BE49-F238E27FC236}">
+                <a16:creationId xmlns:a16="http://schemas.microsoft.com/office/drawing/2014/main" id="{C753E246-BA20-DC30-DB2F-0DF47CE5A31B}"/>
+              </a:ext>
+            </a:extLst>
+          </p:cNvPr>
+          <p:cNvPicPr>
+            <a:picLocks noChangeAspect="1"/>
+          </p:cNvPicPr>
+          <p:nvPr/>
+        </p:nvPicPr>
+        <p:blipFill>
+          <a:blip r:embed="rId5">
+            <a:extLst>
+              <a:ext uri="{28A0092B-C50C-407E-A947-70E740481C1C}">
+                <a14:useLocalDpi xmlns:a14="http://schemas.microsoft.com/office/drawing/2010/main" val="0"/>
+              </a:ext>
+            </a:extLst>
+          </a:blip>
+          <a:stretch>
+            <a:fillRect/>
+          </a:stretch>
+        </p:blipFill>
+        <p:spPr>
+          <a:xfrm>
+            <a:off x="537068" y="1835350"/>
+            <a:ext cx="5198156" cy="3465437"/>
+          </a:xfrm>
+          <a:prstGeom prst="rect">
+            <a:avLst/>
+          </a:prstGeom>
+        </p:spPr>
+      </p:pic>
+    </p:spTree>
+    <p:extLst>
+      <p:ext uri="{BB962C8B-B14F-4D97-AF65-F5344CB8AC3E}">
+        <p14:creationId xmlns:p14="http://schemas.microsoft.com/office/powerpoint/2010/main" val="4019718185"/>
+      </p:ext>
+    </p:extLst>
+  </p:cSld>
+  <p:clrMapOvr>
+    <a:masterClrMapping/>
+  </p:clrMapOvr>
+</p:sld>
+</file>
+
+<file path=ppt/slides/slide13.xml><?xml version="1.0" encoding="utf-8"?>
+<p:sld xmlns:a="http://schemas.openxmlformats.org/drawingml/2006/main" xmlns:r="http://schemas.openxmlformats.org/officeDocument/2006/relationships" xmlns:p="http://schemas.openxmlformats.org/presentationml/2006/main">
+  <p:cSld>
+    <p:spTree>
+      <p:nvGrpSpPr>
+        <p:cNvPr id="1" name=""/>
+        <p:cNvGrpSpPr/>
+        <p:nvPr/>
+      </p:nvGrpSpPr>
+      <p:grpSpPr>
+        <a:xfrm>
+          <a:off x="0" y="0"/>
+          <a:ext cx="0" cy="0"/>
+          <a:chOff x="0" y="0"/>
+          <a:chExt cx="0" cy="0"/>
+        </a:xfrm>
+      </p:grpSpPr>
+      <p:pic>
+        <p:nvPicPr>
+          <p:cNvPr id="6" name="Picture 3" descr="Una red de puntos conectados">
+            <a:extLst>
+              <a:ext uri="{FF2B5EF4-FFF2-40B4-BE49-F238E27FC236}">
+                <a16:creationId xmlns:a16="http://schemas.microsoft.com/office/drawing/2014/main" id="{4EC5ED6C-92B5-57B7-9EC6-E40C78E878D0}"/>
+              </a:ext>
+            </a:extLst>
+          </p:cNvPr>
+          <p:cNvPicPr>
+            <a:picLocks noChangeAspect="1"/>
+          </p:cNvPicPr>
+          <p:nvPr/>
+        </p:nvPicPr>
+        <p:blipFill rotWithShape="1">
+          <a:blip r:embed="rId2">
+            <a:alphaModFix amt="20000"/>
+          </a:blip>
+          <a:srcRect l="20444" b="2030"/>
+          <a:stretch/>
+        </p:blipFill>
+        <p:spPr>
+          <a:xfrm>
+            <a:off x="163114" y="159505"/>
+            <a:ext cx="11865771" cy="6538989"/>
+          </a:xfrm>
+          <a:prstGeom prst="rect">
+            <a:avLst/>
+          </a:prstGeom>
+        </p:spPr>
+      </p:pic>
+      <p:sp>
+        <p:nvSpPr>
+          <p:cNvPr id="2" name="Título 1">
+            <a:extLst>
+              <a:ext uri="{FF2B5EF4-FFF2-40B4-BE49-F238E27FC236}">
+                <a16:creationId xmlns:a16="http://schemas.microsoft.com/office/drawing/2014/main" id="{AC62C56E-7B68-12F5-81B2-857F91BD8380}"/>
+              </a:ext>
+            </a:extLst>
+          </p:cNvPr>
+          <p:cNvSpPr>
+            <a:spLocks noGrp="1"/>
+          </p:cNvSpPr>
+          <p:nvPr>
+            <p:ph type="title"/>
+          </p:nvPr>
+        </p:nvSpPr>
+        <p:spPr>
+          <a:xfrm>
+            <a:off x="537068" y="461115"/>
+            <a:ext cx="10134600" cy="828675"/>
+          </a:xfrm>
+        </p:spPr>
+        <p:txBody>
+          <a:bodyPr>
+            <a:normAutofit/>
+          </a:bodyPr>
+          <a:lstStyle/>
+          <a:p>
+            <a:r>
+              <a:rPr lang="es-PE" sz="4400" dirty="0">
+                <a:solidFill>
+                  <a:schemeClr val="tx1"/>
+                </a:solidFill>
+              </a:rPr>
+              <a:t>6.1 </a:t>
+            </a:r>
+            <a:r>
+              <a:rPr lang="es-PE" sz="4400" dirty="0" err="1">
+                <a:solidFill>
+                  <a:schemeClr val="tx1"/>
+                </a:solidFill>
+              </a:rPr>
+              <a:t>Results</a:t>
+            </a:r>
+            <a:endParaRPr lang="es-PE" sz="4400" dirty="0">
+              <a:solidFill>
+                <a:schemeClr val="tx1"/>
+              </a:solidFill>
+            </a:endParaRPr>
+          </a:p>
+        </p:txBody>
+      </p:sp>
+      <p:pic>
+        <p:nvPicPr>
+          <p:cNvPr id="5" name="Marcador de contenido 4" descr="Un dibujo de un coral&#10;&#10;Descripción generada automáticamente con confianza baja">
+            <a:extLst>
+              <a:ext uri="{FF2B5EF4-FFF2-40B4-BE49-F238E27FC236}">
+                <a16:creationId xmlns:a16="http://schemas.microsoft.com/office/drawing/2014/main" id="{E3C00AE9-27E6-5665-8587-386367E3FBEE}"/>
+              </a:ext>
+            </a:extLst>
+          </p:cNvPr>
+          <p:cNvPicPr>
+            <a:picLocks noGrp="1" noChangeAspect="1"/>
+          </p:cNvPicPr>
+          <p:nvPr>
+            <p:ph idx="1"/>
+          </p:nvPr>
+        </p:nvPicPr>
+        <p:blipFill>
+          <a:blip r:embed="rId3">
+            <a:alphaModFix amt="50000"/>
+            <a:extLst>
+              <a:ext uri="{28A0092B-C50C-407E-A947-70E740481C1C}">
+                <a14:useLocalDpi xmlns:a14="http://schemas.microsoft.com/office/drawing/2010/main" val="0"/>
+              </a:ext>
+            </a:extLst>
+          </a:blip>
+          <a:stretch>
+            <a:fillRect/>
+          </a:stretch>
+        </p:blipFill>
+        <p:spPr>
+          <a:xfrm>
+            <a:off x="9406229" y="3890838"/>
+            <a:ext cx="2530878" cy="3129087"/>
+          </a:xfrm>
+        </p:spPr>
+      </p:pic>
+      <p:pic>
+        <p:nvPicPr>
+          <p:cNvPr id="7" name="Imagen 6" descr="Una captura de pantalla de un celular con texto e imágenes&#10;&#10;Descripción generada automáticamente con confianza baja">
+            <a:extLst>
+              <a:ext uri="{FF2B5EF4-FFF2-40B4-BE49-F238E27FC236}">
+                <a16:creationId xmlns:a16="http://schemas.microsoft.com/office/drawing/2014/main" id="{EABA23E4-48F1-CDCC-CBC3-EF16A88E3857}"/>
+              </a:ext>
+            </a:extLst>
+          </p:cNvPr>
+          <p:cNvPicPr>
+            <a:picLocks noChangeAspect="1"/>
+          </p:cNvPicPr>
+          <p:nvPr/>
+        </p:nvPicPr>
+        <p:blipFill>
+          <a:blip r:embed="rId4">
+            <a:extLst>
+              <a:ext uri="{28A0092B-C50C-407E-A947-70E740481C1C}">
+                <a14:useLocalDpi xmlns:a14="http://schemas.microsoft.com/office/drawing/2010/main" val="0"/>
+              </a:ext>
+            </a:extLst>
+          </a:blip>
+          <a:stretch>
+            <a:fillRect/>
+          </a:stretch>
+        </p:blipFill>
+        <p:spPr>
+          <a:xfrm>
+            <a:off x="266479" y="1426037"/>
+            <a:ext cx="5225557" cy="5225557"/>
+          </a:xfrm>
+          <a:prstGeom prst="rect">
+            <a:avLst/>
+          </a:prstGeom>
+        </p:spPr>
+      </p:pic>
+      <p:pic>
+        <p:nvPicPr>
+          <p:cNvPr id="10" name="Imagen 9" descr="Interfaz de usuario gráfica&#10;&#10;Descripción generada automáticamente">
+            <a:extLst>
+              <a:ext uri="{FF2B5EF4-FFF2-40B4-BE49-F238E27FC236}">
+                <a16:creationId xmlns:a16="http://schemas.microsoft.com/office/drawing/2014/main" id="{F97DB7A2-CFE6-9744-D6EA-BDDE297FEC49}"/>
+              </a:ext>
+            </a:extLst>
+          </p:cNvPr>
+          <p:cNvPicPr>
+            <a:picLocks noChangeAspect="1"/>
+          </p:cNvPicPr>
+          <p:nvPr/>
+        </p:nvPicPr>
+        <p:blipFill>
+          <a:blip r:embed="rId5">
+            <a:extLst>
+              <a:ext uri="{28A0092B-C50C-407E-A947-70E740481C1C}">
+                <a14:useLocalDpi xmlns:a14="http://schemas.microsoft.com/office/drawing/2010/main" val="0"/>
+              </a:ext>
+            </a:extLst>
+          </a:blip>
+          <a:stretch>
+            <a:fillRect/>
+          </a:stretch>
+        </p:blipFill>
+        <p:spPr>
+          <a:xfrm>
+            <a:off x="5500151" y="1426037"/>
+            <a:ext cx="6436956" cy="5225557"/>
+          </a:xfrm>
+          <a:prstGeom prst="rect">
+            <a:avLst/>
+          </a:prstGeom>
+        </p:spPr>
+      </p:pic>
+    </p:spTree>
+    <p:extLst>
+      <p:ext uri="{BB962C8B-B14F-4D97-AF65-F5344CB8AC3E}">
+        <p14:creationId xmlns:p14="http://schemas.microsoft.com/office/powerpoint/2010/main" val="2469733182"/>
+      </p:ext>
+    </p:extLst>
+  </p:cSld>
+  <p:clrMapOvr>
+    <a:masterClrMapping/>
+  </p:clrMapOvr>
+</p:sld>
+</file>
+
+<file path=ppt/slides/slide14.xml><?xml version="1.0" encoding="utf-8"?>
+<p:sld xmlns:a="http://schemas.openxmlformats.org/drawingml/2006/main" xmlns:r="http://schemas.openxmlformats.org/officeDocument/2006/relationships" xmlns:p="http://schemas.openxmlformats.org/presentationml/2006/main">
+  <p:cSld>
+    <p:spTree>
+      <p:nvGrpSpPr>
+        <p:cNvPr id="1" name=""/>
+        <p:cNvGrpSpPr/>
+        <p:nvPr/>
+      </p:nvGrpSpPr>
+      <p:grpSpPr>
+        <a:xfrm>
+          <a:off x="0" y="0"/>
+          <a:ext cx="0" cy="0"/>
+          <a:chOff x="0" y="0"/>
+          <a:chExt cx="0" cy="0"/>
+        </a:xfrm>
+      </p:grpSpPr>
+      <p:pic>
+        <p:nvPicPr>
+          <p:cNvPr id="6" name="Picture 3" descr="Una red de puntos conectados">
+            <a:extLst>
+              <a:ext uri="{FF2B5EF4-FFF2-40B4-BE49-F238E27FC236}">
+                <a16:creationId xmlns:a16="http://schemas.microsoft.com/office/drawing/2014/main" id="{4EC5ED6C-92B5-57B7-9EC6-E40C78E878D0}"/>
+              </a:ext>
+            </a:extLst>
+          </p:cNvPr>
+          <p:cNvPicPr>
+            <a:picLocks noChangeAspect="1"/>
+          </p:cNvPicPr>
+          <p:nvPr/>
+        </p:nvPicPr>
+        <p:blipFill rotWithShape="1">
+          <a:blip r:embed="rId2">
+            <a:alphaModFix amt="20000"/>
+          </a:blip>
+          <a:srcRect l="20444" b="2030"/>
+          <a:stretch/>
+        </p:blipFill>
+        <p:spPr>
+          <a:xfrm>
+            <a:off x="163114" y="159505"/>
+            <a:ext cx="11865771" cy="6538989"/>
+          </a:xfrm>
+          <a:prstGeom prst="rect">
+            <a:avLst/>
+          </a:prstGeom>
+        </p:spPr>
+      </p:pic>
+      <p:sp>
+        <p:nvSpPr>
+          <p:cNvPr id="2" name="Título 1">
+            <a:extLst>
+              <a:ext uri="{FF2B5EF4-FFF2-40B4-BE49-F238E27FC236}">
+                <a16:creationId xmlns:a16="http://schemas.microsoft.com/office/drawing/2014/main" id="{AC62C56E-7B68-12F5-81B2-857F91BD8380}"/>
+              </a:ext>
+            </a:extLst>
+          </p:cNvPr>
+          <p:cNvSpPr>
+            <a:spLocks noGrp="1"/>
+          </p:cNvSpPr>
+          <p:nvPr>
+            <p:ph type="title"/>
+          </p:nvPr>
+        </p:nvSpPr>
+        <p:spPr>
+          <a:xfrm>
+            <a:off x="537068" y="461115"/>
+            <a:ext cx="10134600" cy="828675"/>
+          </a:xfrm>
+        </p:spPr>
+        <p:txBody>
+          <a:bodyPr>
+            <a:normAutofit/>
+          </a:bodyPr>
+          <a:lstStyle/>
+          <a:p>
+            <a:r>
+              <a:rPr lang="es-PE" sz="4400" dirty="0">
+                <a:solidFill>
+                  <a:schemeClr val="tx1"/>
+                </a:solidFill>
+              </a:rPr>
+              <a:t>6.2 </a:t>
+            </a:r>
+            <a:r>
+              <a:rPr lang="es-PE" sz="4400" dirty="0" err="1">
+                <a:solidFill>
+                  <a:schemeClr val="tx1"/>
+                </a:solidFill>
+              </a:rPr>
+              <a:t>Results</a:t>
+            </a:r>
+            <a:r>
+              <a:rPr lang="es-PE" sz="4400" dirty="0">
+                <a:solidFill>
+                  <a:schemeClr val="tx1"/>
+                </a:solidFill>
+              </a:rPr>
+              <a:t> </a:t>
+            </a:r>
+            <a:r>
+              <a:rPr lang="es-PE" sz="4400" dirty="0" err="1">
+                <a:solidFill>
+                  <a:schemeClr val="tx1"/>
+                </a:solidFill>
+              </a:rPr>
+              <a:t>with</a:t>
+            </a:r>
+            <a:r>
+              <a:rPr lang="es-PE" sz="4400" dirty="0">
+                <a:solidFill>
+                  <a:schemeClr val="tx1"/>
+                </a:solidFill>
+              </a:rPr>
+              <a:t> </a:t>
+            </a:r>
+            <a:r>
+              <a:rPr lang="es-PE" sz="4400" dirty="0" err="1">
+                <a:solidFill>
+                  <a:schemeClr val="tx1"/>
+                </a:solidFill>
+              </a:rPr>
+              <a:t>Streamlit</a:t>
+            </a:r>
+            <a:r>
+              <a:rPr lang="es-PE" sz="4400" dirty="0">
+                <a:solidFill>
+                  <a:schemeClr val="tx1"/>
+                </a:solidFill>
+              </a:rPr>
+              <a:t> and </a:t>
+            </a:r>
+            <a:r>
+              <a:rPr lang="es-PE" sz="4400" dirty="0" err="1">
+                <a:solidFill>
+                  <a:schemeClr val="tx1"/>
+                </a:solidFill>
+              </a:rPr>
+              <a:t>FastAPI</a:t>
+            </a:r>
+            <a:endParaRPr lang="es-PE" sz="4400" dirty="0">
+              <a:solidFill>
+                <a:schemeClr val="tx1"/>
+              </a:solidFill>
+            </a:endParaRPr>
+          </a:p>
+        </p:txBody>
+      </p:sp>
+      <p:pic>
+        <p:nvPicPr>
+          <p:cNvPr id="5" name="Marcador de contenido 4" descr="Un dibujo de un coral&#10;&#10;Descripción generada automáticamente con confianza baja">
+            <a:extLst>
+              <a:ext uri="{FF2B5EF4-FFF2-40B4-BE49-F238E27FC236}">
+                <a16:creationId xmlns:a16="http://schemas.microsoft.com/office/drawing/2014/main" id="{E3C00AE9-27E6-5665-8587-386367E3FBEE}"/>
+              </a:ext>
+            </a:extLst>
+          </p:cNvPr>
+          <p:cNvPicPr>
+            <a:picLocks noGrp="1" noChangeAspect="1"/>
+          </p:cNvPicPr>
+          <p:nvPr>
+            <p:ph idx="1"/>
+          </p:nvPr>
+        </p:nvPicPr>
+        <p:blipFill>
+          <a:blip r:embed="rId3">
+            <a:alphaModFix amt="50000"/>
+            <a:extLst>
+              <a:ext uri="{28A0092B-C50C-407E-A947-70E740481C1C}">
+                <a14:useLocalDpi xmlns:a14="http://schemas.microsoft.com/office/drawing/2010/main" val="0"/>
+              </a:ext>
+            </a:extLst>
+          </a:blip>
+          <a:stretch>
+            <a:fillRect/>
+          </a:stretch>
+        </p:blipFill>
+        <p:spPr>
+          <a:xfrm>
+            <a:off x="9406229" y="3890838"/>
+            <a:ext cx="2530878" cy="3129087"/>
+          </a:xfrm>
+        </p:spPr>
+      </p:pic>
+      <p:pic>
+        <p:nvPicPr>
+          <p:cNvPr id="7" name="Imagen 6">
+            <a:extLst>
+              <a:ext uri="{FF2B5EF4-FFF2-40B4-BE49-F238E27FC236}">
+                <a16:creationId xmlns:a16="http://schemas.microsoft.com/office/drawing/2014/main" id="{1BCEC7D7-EBBE-D01F-BE14-B545FD73103B}"/>
+              </a:ext>
+            </a:extLst>
+          </p:cNvPr>
+          <p:cNvPicPr>
+            <a:picLocks noChangeAspect="1"/>
+          </p:cNvPicPr>
+          <p:nvPr/>
+        </p:nvPicPr>
+        <p:blipFill>
+          <a:blip r:embed="rId4"/>
+          <a:stretch>
+            <a:fillRect/>
+          </a:stretch>
+        </p:blipFill>
+        <p:spPr>
+          <a:xfrm>
+            <a:off x="2662073" y="1188562"/>
+            <a:ext cx="6867852" cy="5404551"/>
+          </a:xfrm>
+          <a:prstGeom prst="rect">
+            <a:avLst/>
+          </a:prstGeom>
+        </p:spPr>
+      </p:pic>
+    </p:spTree>
+    <p:extLst>
+      <p:ext uri="{BB962C8B-B14F-4D97-AF65-F5344CB8AC3E}">
+        <p14:creationId xmlns:p14="http://schemas.microsoft.com/office/powerpoint/2010/main" val="1546287157"/>
+      </p:ext>
+    </p:extLst>
+  </p:cSld>
+  <p:clrMapOvr>
+    <a:masterClrMapping/>
+  </p:clrMapOvr>
+</p:sld>
+</file>
+
+<file path=ppt/slides/slide15.xml><?xml version="1.0" encoding="utf-8"?>
+<p:sld xmlns:a="http://schemas.openxmlformats.org/drawingml/2006/main" xmlns:r="http://schemas.openxmlformats.org/officeDocument/2006/relationships" xmlns:p="http://schemas.openxmlformats.org/presentationml/2006/main">
+  <p:cSld>
+    <p:spTree>
+      <p:nvGrpSpPr>
+        <p:cNvPr id="1" name=""/>
+        <p:cNvGrpSpPr/>
+        <p:nvPr/>
+      </p:nvGrpSpPr>
+      <p:grpSpPr>
+        <a:xfrm>
+          <a:off x="0" y="0"/>
+          <a:ext cx="0" cy="0"/>
+          <a:chOff x="0" y="0"/>
+          <a:chExt cx="0" cy="0"/>
+        </a:xfrm>
+      </p:grpSpPr>
+      <p:pic>
+        <p:nvPicPr>
+          <p:cNvPr id="6" name="Picture 3" descr="Una red de puntos conectados">
+            <a:extLst>
+              <a:ext uri="{FF2B5EF4-FFF2-40B4-BE49-F238E27FC236}">
+                <a16:creationId xmlns:a16="http://schemas.microsoft.com/office/drawing/2014/main" id="{4EC5ED6C-92B5-57B7-9EC6-E40C78E878D0}"/>
+              </a:ext>
+            </a:extLst>
+          </p:cNvPr>
+          <p:cNvPicPr>
+            <a:picLocks noChangeAspect="1"/>
+          </p:cNvPicPr>
+          <p:nvPr/>
+        </p:nvPicPr>
+        <p:blipFill rotWithShape="1">
+          <a:blip r:embed="rId2">
+            <a:alphaModFix amt="20000"/>
+          </a:blip>
+          <a:srcRect l="20444" b="2030"/>
+          <a:stretch/>
+        </p:blipFill>
+        <p:spPr>
+          <a:xfrm>
+            <a:off x="163114" y="159505"/>
+            <a:ext cx="11865771" cy="6538989"/>
+          </a:xfrm>
+          <a:prstGeom prst="rect">
+            <a:avLst/>
+          </a:prstGeom>
+        </p:spPr>
+      </p:pic>
+      <p:sp>
+        <p:nvSpPr>
+          <p:cNvPr id="2" name="Título 1">
+            <a:extLst>
+              <a:ext uri="{FF2B5EF4-FFF2-40B4-BE49-F238E27FC236}">
+                <a16:creationId xmlns:a16="http://schemas.microsoft.com/office/drawing/2014/main" id="{AC62C56E-7B68-12F5-81B2-857F91BD8380}"/>
+              </a:ext>
+            </a:extLst>
+          </p:cNvPr>
+          <p:cNvSpPr>
+            <a:spLocks noGrp="1"/>
+          </p:cNvSpPr>
+          <p:nvPr>
+            <p:ph type="title"/>
+          </p:nvPr>
+        </p:nvSpPr>
+        <p:spPr>
+          <a:xfrm>
+            <a:off x="537067" y="472366"/>
+            <a:ext cx="11400039" cy="828675"/>
+          </a:xfrm>
+        </p:spPr>
+        <p:txBody>
+          <a:bodyPr>
+            <a:normAutofit fontScale="90000"/>
+          </a:bodyPr>
+          <a:lstStyle/>
+          <a:p>
+            <a:r>
+              <a:rPr lang="es-PE" sz="4400" dirty="0">
+                <a:solidFill>
+                  <a:schemeClr val="tx1"/>
+                </a:solidFill>
+              </a:rPr>
+              <a:t>7. YOLO-V8 WITH INSTANCE SEGMENTATION</a:t>
+            </a:r>
+          </a:p>
+        </p:txBody>
+      </p:sp>
+      <p:pic>
+        <p:nvPicPr>
+          <p:cNvPr id="5" name="Marcador de contenido 4" descr="Un dibujo de un coral&#10;&#10;Descripción generada automáticamente con confianza baja">
+            <a:extLst>
+              <a:ext uri="{FF2B5EF4-FFF2-40B4-BE49-F238E27FC236}">
+                <a16:creationId xmlns:a16="http://schemas.microsoft.com/office/drawing/2014/main" id="{E3C00AE9-27E6-5665-8587-386367E3FBEE}"/>
+              </a:ext>
+            </a:extLst>
+          </p:cNvPr>
+          <p:cNvPicPr>
+            <a:picLocks noGrp="1" noChangeAspect="1"/>
+          </p:cNvPicPr>
+          <p:nvPr>
+            <p:ph idx="1"/>
+          </p:nvPr>
+        </p:nvPicPr>
+        <p:blipFill>
+          <a:blip r:embed="rId3">
+            <a:alphaModFix amt="50000"/>
+            <a:extLst>
+              <a:ext uri="{28A0092B-C50C-407E-A947-70E740481C1C}">
+                <a14:useLocalDpi xmlns:a14="http://schemas.microsoft.com/office/drawing/2010/main" val="0"/>
+              </a:ext>
+            </a:extLst>
+          </a:blip>
+          <a:stretch>
+            <a:fillRect/>
+          </a:stretch>
+        </p:blipFill>
+        <p:spPr>
+          <a:xfrm>
+            <a:off x="9406229" y="3890838"/>
+            <a:ext cx="2530878" cy="3129087"/>
+          </a:xfrm>
+        </p:spPr>
+      </p:pic>
+      <p:sp>
+        <p:nvSpPr>
+          <p:cNvPr id="16" name="CuadroTexto 15">
+            <a:extLst>
+              <a:ext uri="{FF2B5EF4-FFF2-40B4-BE49-F238E27FC236}">
+                <a16:creationId xmlns:a16="http://schemas.microsoft.com/office/drawing/2014/main" id="{90EB6D43-5F05-6D1B-1027-12C72286531F}"/>
+              </a:ext>
+            </a:extLst>
+          </p:cNvPr>
+          <p:cNvSpPr txBox="1"/>
+          <p:nvPr/>
+        </p:nvSpPr>
+        <p:spPr>
+          <a:xfrm>
+            <a:off x="946643" y="1377953"/>
+            <a:ext cx="9725025" cy="646331"/>
+          </a:xfrm>
+          <a:prstGeom prst="rect">
+            <a:avLst/>
+          </a:prstGeom>
+          <a:noFill/>
+        </p:spPr>
+        <p:txBody>
+          <a:bodyPr wrap="square" rtlCol="0">
+            <a:spAutoFit/>
+          </a:bodyPr>
+          <a:lstStyle/>
+          <a:p>
+            <a:r>
+              <a:rPr lang="es-PE" dirty="0" err="1"/>
+              <a:t>The</a:t>
+            </a:r>
+            <a:r>
+              <a:rPr lang="es-PE" dirty="0"/>
+              <a:t> YoloV8-SEG </a:t>
+            </a:r>
+            <a:r>
+              <a:rPr lang="es-PE" dirty="0" err="1"/>
+              <a:t>model</a:t>
+            </a:r>
+            <a:r>
+              <a:rPr lang="es-PE" dirty="0"/>
+              <a:t> </a:t>
+            </a:r>
+            <a:r>
+              <a:rPr lang="es-PE" dirty="0" err="1"/>
+              <a:t>is</a:t>
+            </a:r>
+            <a:r>
+              <a:rPr lang="es-PE" dirty="0"/>
+              <a:t> a </a:t>
+            </a:r>
+            <a:r>
+              <a:rPr lang="es-PE" dirty="0" err="1"/>
+              <a:t>pretrained</a:t>
+            </a:r>
+            <a:r>
+              <a:rPr lang="es-PE" dirty="0"/>
+              <a:t> </a:t>
+            </a:r>
+            <a:r>
+              <a:rPr lang="es-PE" dirty="0" err="1"/>
+              <a:t>model</a:t>
+            </a:r>
+            <a:r>
+              <a:rPr lang="es-PE" dirty="0"/>
+              <a:t> </a:t>
+            </a:r>
+            <a:r>
+              <a:rPr lang="es-PE" dirty="0" err="1"/>
+              <a:t>downloaded</a:t>
+            </a:r>
+            <a:r>
+              <a:rPr lang="es-PE" dirty="0"/>
+              <a:t> </a:t>
+            </a:r>
+            <a:r>
+              <a:rPr lang="es-PE" dirty="0" err="1"/>
+              <a:t>from</a:t>
+            </a:r>
+            <a:r>
+              <a:rPr lang="es-PE" dirty="0"/>
+              <a:t> </a:t>
+            </a:r>
+            <a:r>
+              <a:rPr lang="es-PE" dirty="0" err="1"/>
+              <a:t>the</a:t>
+            </a:r>
+            <a:r>
+              <a:rPr lang="es-PE" dirty="0"/>
+              <a:t> </a:t>
+            </a:r>
+            <a:r>
+              <a:rPr lang="es-PE" dirty="0" err="1"/>
+              <a:t>library</a:t>
+            </a:r>
+            <a:r>
+              <a:rPr lang="es-PE" dirty="0"/>
+              <a:t> “</a:t>
+            </a:r>
+            <a:r>
+              <a:rPr lang="es-PE" dirty="0" err="1"/>
+              <a:t>Ultralytics</a:t>
+            </a:r>
+            <a:r>
+              <a:rPr lang="es-PE" dirty="0"/>
+              <a:t>”.</a:t>
+            </a:r>
+          </a:p>
+          <a:p>
+            <a:r>
+              <a:rPr lang="es-PE" dirty="0" err="1"/>
+              <a:t>The</a:t>
+            </a:r>
+            <a:r>
+              <a:rPr lang="es-PE" dirty="0"/>
+              <a:t> YoloV8 </a:t>
+            </a:r>
+            <a:r>
+              <a:rPr lang="es-PE" dirty="0" err="1"/>
+              <a:t>was</a:t>
+            </a:r>
+            <a:r>
+              <a:rPr lang="es-PE" dirty="0"/>
+              <a:t> </a:t>
+            </a:r>
+            <a:r>
+              <a:rPr lang="es-PE" dirty="0" err="1"/>
+              <a:t>finetuned</a:t>
+            </a:r>
+            <a:r>
+              <a:rPr lang="es-PE" dirty="0"/>
+              <a:t> </a:t>
+            </a:r>
+            <a:r>
+              <a:rPr lang="es-PE" dirty="0" err="1"/>
+              <a:t>to</a:t>
+            </a:r>
+            <a:r>
+              <a:rPr lang="es-PE" dirty="0"/>
+              <a:t> </a:t>
+            </a:r>
+            <a:r>
+              <a:rPr lang="es-PE" dirty="0" err="1"/>
+              <a:t>bone</a:t>
+            </a:r>
+            <a:r>
+              <a:rPr lang="es-PE" dirty="0"/>
+              <a:t> fracture </a:t>
+            </a:r>
+            <a:r>
+              <a:rPr lang="es-PE" dirty="0" err="1"/>
+              <a:t>instance</a:t>
+            </a:r>
+            <a:r>
+              <a:rPr lang="es-PE" dirty="0"/>
+              <a:t> </a:t>
+            </a:r>
+            <a:r>
+              <a:rPr lang="es-PE" dirty="0" err="1"/>
+              <a:t>segmentation</a:t>
+            </a:r>
+            <a:r>
+              <a:rPr lang="es-PE" dirty="0"/>
+              <a:t>.  </a:t>
+            </a:r>
+          </a:p>
+        </p:txBody>
+      </p:sp>
+      <p:sp>
+        <p:nvSpPr>
+          <p:cNvPr id="4" name="Rectangle 2">
+            <a:extLst>
+              <a:ext uri="{FF2B5EF4-FFF2-40B4-BE49-F238E27FC236}">
+                <a16:creationId xmlns:a16="http://schemas.microsoft.com/office/drawing/2014/main" id="{8A15156B-7E92-89CD-6719-A9503045E116}"/>
+              </a:ext>
+            </a:extLst>
+          </p:cNvPr>
+          <p:cNvSpPr>
+            <a:spLocks noChangeArrowheads="1"/>
+          </p:cNvSpPr>
+          <p:nvPr/>
+        </p:nvSpPr>
+        <p:spPr bwMode="auto">
+          <a:xfrm>
+            <a:off x="0" y="0"/>
+            <a:ext cx="12192000" cy="457200"/>
+          </a:xfrm>
+          <a:prstGeom prst="rect">
+            <a:avLst/>
+          </a:prstGeom>
+          <a:noFill/>
+          <a:ln>
+            <a:noFill/>
+          </a:ln>
+          <a:effectLst/>
+          <a:extLst>
+            <a:ext uri="{909E8E84-426E-40DD-AFC4-6F175D3DCCD1}">
+              <a14:hiddenFill xmlns:a14="http://schemas.microsoft.com/office/drawing/2010/main">
+                <a:solidFill>
+                  <a:schemeClr val="accent1"/>
+                </a:solidFill>
+              </a14:hiddenFill>
+            </a:ext>
+            <a:ext uri="{91240B29-F687-4F45-9708-019B960494DF}">
+              <a14:hiddenLine xmlns:a14="http://schemas.microsoft.com/office/drawing/2010/main" w="9525">
+                <a:solidFill>
+                  <a:schemeClr val="tx1"/>
+                </a:solidFill>
+                <a:miter lim="800000"/>
+                <a:headEnd/>
+                <a:tailEnd/>
+              </a14:hiddenLine>
+            </a:ext>
+            <a:ext uri="{AF507438-7753-43E0-B8FC-AC1667EBCBE1}">
+              <a14:hiddenEffects xmlns:a14="http://schemas.microsoft.com/office/drawing/2010/main">
+                <a:effectLst>
+                  <a:outerShdw dist="35921" dir="2700000" algn="ctr" rotWithShape="0">
+                    <a:schemeClr val="bg2"/>
+                  </a:outerShdw>
+                </a:effectLst>
+              </a14:hiddenEffects>
+            </a:ext>
+          </a:extLst>
+        </p:spPr>
+        <p:txBody>
+          <a:bodyPr vert="horz" wrap="none" lIns="0" tIns="0" rIns="0" bIns="0" numCol="1" anchor="ctr" anchorCtr="0" compatLnSpc="1">
+            <a:prstTxWarp prst="textNoShape">
+              <a:avLst/>
+            </a:prstTxWarp>
+            <a:spAutoFit/>
+          </a:bodyPr>
+          <a:lstStyle/>
+          <a:p>
+            <a:pPr marL="0" marR="0" lvl="0" indent="0" algn="l" defTabSz="914400" rtl="0" eaLnBrk="0" fontAlgn="base" latinLnBrk="0" hangingPunct="0">
+              <a:lnSpc>
+                <a:spcPct val="100000"/>
+              </a:lnSpc>
+              <a:spcBef>
+                <a:spcPct val="0"/>
+              </a:spcBef>
+              <a:spcAft>
+                <a:spcPct val="0"/>
+              </a:spcAft>
+              <a:buClrTx/>
+              <a:buSzTx/>
+              <a:buFontTx/>
+              <a:buNone/>
+              <a:tabLst/>
+            </a:pPr>
+            <a:r>
+              <a:rPr kumimoji="0" lang="es-PE" altLang="es-PE" sz="1000" b="0" i="0" u="none" strike="noStrike" cap="none" normalizeH="0" baseline="0">
+                <a:ln>
+                  <a:noFill/>
+                </a:ln>
+                <a:solidFill>
+                  <a:srgbClr val="E6EDF3"/>
+                </a:solidFill>
+                <a:effectLst/>
+                <a:latin typeface="ui-monospace"/>
+              </a:rPr>
+              <a:t>ultralytics</a:t>
+            </a:r>
+            <a:r>
+              <a:rPr kumimoji="0" lang="es-PE" altLang="es-PE" sz="800" b="0" i="0" u="none" strike="noStrike" cap="none" normalizeH="0" baseline="0">
+                <a:ln>
+                  <a:noFill/>
+                </a:ln>
+                <a:solidFill>
+                  <a:schemeClr val="tx1"/>
+                </a:solidFill>
+                <a:effectLst/>
+              </a:rPr>
+              <a:t> </a:t>
+            </a:r>
+            <a:endParaRPr kumimoji="0" lang="es-PE" altLang="es-PE" sz="1800" b="0" i="0" u="none" strike="noStrike" cap="none" normalizeH="0" baseline="0">
+              <a:ln>
+                <a:noFill/>
+              </a:ln>
+              <a:solidFill>
+                <a:schemeClr val="tx1"/>
+              </a:solidFill>
+              <a:effectLst/>
+              <a:latin typeface="Arial" panose="020B0604020202020204" pitchFamily="34" charset="0"/>
+            </a:endParaRPr>
+          </a:p>
+        </p:txBody>
+      </p:sp>
+      <p:pic>
+        <p:nvPicPr>
+          <p:cNvPr id="7" name="Imagen 6">
+            <a:extLst>
+              <a:ext uri="{FF2B5EF4-FFF2-40B4-BE49-F238E27FC236}">
+                <a16:creationId xmlns:a16="http://schemas.microsoft.com/office/drawing/2014/main" id="{DDDA046C-B401-A8E7-A13A-D9EE9E06EEA9}"/>
+              </a:ext>
+            </a:extLst>
+          </p:cNvPr>
+          <p:cNvPicPr>
+            <a:picLocks noChangeAspect="1"/>
+          </p:cNvPicPr>
+          <p:nvPr/>
+        </p:nvPicPr>
+        <p:blipFill>
+          <a:blip r:embed="rId4"/>
+          <a:stretch>
+            <a:fillRect/>
+          </a:stretch>
+        </p:blipFill>
+        <p:spPr>
+          <a:xfrm>
+            <a:off x="946643" y="2280948"/>
+            <a:ext cx="10409822" cy="4160881"/>
+          </a:xfrm>
+          <a:prstGeom prst="rect">
+            <a:avLst/>
+          </a:prstGeom>
+        </p:spPr>
+      </p:pic>
+    </p:spTree>
+    <p:extLst>
+      <p:ext uri="{BB962C8B-B14F-4D97-AF65-F5344CB8AC3E}">
+        <p14:creationId xmlns:p14="http://schemas.microsoft.com/office/powerpoint/2010/main" val="1083432493"/>
+      </p:ext>
+    </p:extLst>
+  </p:cSld>
+  <p:clrMapOvr>
+    <a:masterClrMapping/>
+  </p:clrMapOvr>
+</p:sld>
+</file>
+
+<file path=ppt/slides/slide16.xml><?xml version="1.0" encoding="utf-8"?>
+<p:sld xmlns:a="http://schemas.openxmlformats.org/drawingml/2006/main" xmlns:r="http://schemas.openxmlformats.org/officeDocument/2006/relationships" xmlns:p="http://schemas.openxmlformats.org/presentationml/2006/main">
+  <p:cSld>
+    <p:spTree>
+      <p:nvGrpSpPr>
+        <p:cNvPr id="1" name=""/>
+        <p:cNvGrpSpPr/>
+        <p:nvPr/>
+      </p:nvGrpSpPr>
+      <p:grpSpPr>
+        <a:xfrm>
+          <a:off x="0" y="0"/>
+          <a:ext cx="0" cy="0"/>
+          <a:chOff x="0" y="0"/>
+          <a:chExt cx="0" cy="0"/>
+        </a:xfrm>
+      </p:grpSpPr>
+      <p:pic>
+        <p:nvPicPr>
+          <p:cNvPr id="6" name="Picture 3" descr="Una red de puntos conectados">
+            <a:extLst>
+              <a:ext uri="{FF2B5EF4-FFF2-40B4-BE49-F238E27FC236}">
+                <a16:creationId xmlns:a16="http://schemas.microsoft.com/office/drawing/2014/main" id="{4EC5ED6C-92B5-57B7-9EC6-E40C78E878D0}"/>
+              </a:ext>
+            </a:extLst>
+          </p:cNvPr>
+          <p:cNvPicPr>
+            <a:picLocks noChangeAspect="1"/>
+          </p:cNvPicPr>
+          <p:nvPr/>
+        </p:nvPicPr>
+        <p:blipFill rotWithShape="1">
+          <a:blip r:embed="rId2">
+            <a:alphaModFix amt="20000"/>
+          </a:blip>
+          <a:srcRect l="20444" b="2030"/>
+          <a:stretch/>
+        </p:blipFill>
+        <p:spPr>
+          <a:xfrm>
+            <a:off x="163114" y="159505"/>
+            <a:ext cx="11865771" cy="6538989"/>
+          </a:xfrm>
+          <a:prstGeom prst="rect">
+            <a:avLst/>
+          </a:prstGeom>
+        </p:spPr>
+      </p:pic>
+      <p:sp>
+        <p:nvSpPr>
+          <p:cNvPr id="2" name="Título 1">
+            <a:extLst>
+              <a:ext uri="{FF2B5EF4-FFF2-40B4-BE49-F238E27FC236}">
+                <a16:creationId xmlns:a16="http://schemas.microsoft.com/office/drawing/2014/main" id="{AC62C56E-7B68-12F5-81B2-857F91BD8380}"/>
+              </a:ext>
+            </a:extLst>
+          </p:cNvPr>
+          <p:cNvSpPr>
+            <a:spLocks noGrp="1"/>
+          </p:cNvSpPr>
+          <p:nvPr>
+            <p:ph type="title"/>
+          </p:nvPr>
+        </p:nvSpPr>
+        <p:spPr>
+          <a:xfrm>
+            <a:off x="537068" y="461115"/>
+            <a:ext cx="10134600" cy="828675"/>
+          </a:xfrm>
+        </p:spPr>
+        <p:txBody>
+          <a:bodyPr>
+            <a:normAutofit/>
+          </a:bodyPr>
+          <a:lstStyle/>
+          <a:p>
+            <a:r>
+              <a:rPr lang="es-PE" sz="4400" dirty="0">
+                <a:solidFill>
+                  <a:schemeClr val="tx1"/>
+                </a:solidFill>
+              </a:rPr>
+              <a:t>7.1 </a:t>
+            </a:r>
+            <a:r>
+              <a:rPr lang="es-PE" sz="4400" dirty="0" err="1">
+                <a:solidFill>
+                  <a:schemeClr val="tx1"/>
+                </a:solidFill>
+              </a:rPr>
+              <a:t>Results</a:t>
+            </a:r>
+            <a:endParaRPr lang="es-PE" sz="4400" dirty="0">
+              <a:solidFill>
+                <a:schemeClr val="tx1"/>
+              </a:solidFill>
+            </a:endParaRPr>
+          </a:p>
+        </p:txBody>
+      </p:sp>
+      <p:pic>
+        <p:nvPicPr>
+          <p:cNvPr id="5" name="Marcador de contenido 4" descr="Un dibujo de un coral&#10;&#10;Descripción generada automáticamente con confianza baja">
+            <a:extLst>
+              <a:ext uri="{FF2B5EF4-FFF2-40B4-BE49-F238E27FC236}">
+                <a16:creationId xmlns:a16="http://schemas.microsoft.com/office/drawing/2014/main" id="{E3C00AE9-27E6-5665-8587-386367E3FBEE}"/>
+              </a:ext>
+            </a:extLst>
+          </p:cNvPr>
+          <p:cNvPicPr>
+            <a:picLocks noGrp="1" noChangeAspect="1"/>
+          </p:cNvPicPr>
+          <p:nvPr>
+            <p:ph idx="1"/>
+          </p:nvPr>
+        </p:nvPicPr>
+        <p:blipFill>
+          <a:blip r:embed="rId3">
+            <a:alphaModFix amt="50000"/>
+            <a:extLst>
+              <a:ext uri="{28A0092B-C50C-407E-A947-70E740481C1C}">
+                <a14:useLocalDpi xmlns:a14="http://schemas.microsoft.com/office/drawing/2010/main" val="0"/>
+              </a:ext>
+            </a:extLst>
+          </a:blip>
+          <a:stretch>
+            <a:fillRect/>
+          </a:stretch>
+        </p:blipFill>
+        <p:spPr>
+          <a:xfrm>
+            <a:off x="9406229" y="3890838"/>
+            <a:ext cx="2530878" cy="3129087"/>
+          </a:xfrm>
+        </p:spPr>
+      </p:pic>
+      <p:pic>
+        <p:nvPicPr>
+          <p:cNvPr id="9" name="Imagen 8" descr="Gráfico, Gráfico de dispersión&#10;&#10;Descripción generada automáticamente">
+            <a:extLst>
+              <a:ext uri="{FF2B5EF4-FFF2-40B4-BE49-F238E27FC236}">
+                <a16:creationId xmlns:a16="http://schemas.microsoft.com/office/drawing/2014/main" id="{EC791B40-0437-B196-4115-3BA9B8C10794}"/>
+              </a:ext>
+            </a:extLst>
+          </p:cNvPr>
+          <p:cNvPicPr>
+            <a:picLocks noChangeAspect="1"/>
+          </p:cNvPicPr>
+          <p:nvPr/>
+        </p:nvPicPr>
+        <p:blipFill>
+          <a:blip r:embed="rId4">
+            <a:extLst>
+              <a:ext uri="{28A0092B-C50C-407E-A947-70E740481C1C}">
+                <a14:useLocalDpi xmlns:a14="http://schemas.microsoft.com/office/drawing/2010/main" val="0"/>
+              </a:ext>
+            </a:extLst>
+          </a:blip>
+          <a:stretch>
+            <a:fillRect/>
+          </a:stretch>
+        </p:blipFill>
+        <p:spPr>
+          <a:xfrm>
+            <a:off x="163114" y="1750021"/>
+            <a:ext cx="11824958" cy="3941653"/>
+          </a:xfrm>
+          <a:prstGeom prst="rect">
+            <a:avLst/>
+          </a:prstGeom>
+        </p:spPr>
+      </p:pic>
+    </p:spTree>
+    <p:extLst>
+      <p:ext uri="{BB962C8B-B14F-4D97-AF65-F5344CB8AC3E}">
+        <p14:creationId xmlns:p14="http://schemas.microsoft.com/office/powerpoint/2010/main" val="1696976454"/>
+      </p:ext>
+    </p:extLst>
+  </p:cSld>
+  <p:clrMapOvr>
+    <a:masterClrMapping/>
+  </p:clrMapOvr>
+</p:sld>
+</file>
+
+<file path=ppt/slides/slide17.xml><?xml version="1.0" encoding="utf-8"?>
+<p:sld xmlns:a="http://schemas.openxmlformats.org/drawingml/2006/main" xmlns:r="http://schemas.openxmlformats.org/officeDocument/2006/relationships" xmlns:p="http://schemas.openxmlformats.org/presentationml/2006/main">
+  <p:cSld>
+    <p:spTree>
+      <p:nvGrpSpPr>
+        <p:cNvPr id="1" name=""/>
+        <p:cNvGrpSpPr/>
+        <p:nvPr/>
+      </p:nvGrpSpPr>
+      <p:grpSpPr>
+        <a:xfrm>
+          <a:off x="0" y="0"/>
+          <a:ext cx="0" cy="0"/>
+          <a:chOff x="0" y="0"/>
+          <a:chExt cx="0" cy="0"/>
+        </a:xfrm>
+      </p:grpSpPr>
+      <p:pic>
+        <p:nvPicPr>
+          <p:cNvPr id="6" name="Picture 3" descr="Una red de puntos conectados">
+            <a:extLst>
+              <a:ext uri="{FF2B5EF4-FFF2-40B4-BE49-F238E27FC236}">
+                <a16:creationId xmlns:a16="http://schemas.microsoft.com/office/drawing/2014/main" id="{4EC5ED6C-92B5-57B7-9EC6-E40C78E878D0}"/>
+              </a:ext>
+            </a:extLst>
+          </p:cNvPr>
+          <p:cNvPicPr>
+            <a:picLocks noChangeAspect="1"/>
+          </p:cNvPicPr>
+          <p:nvPr/>
+        </p:nvPicPr>
+        <p:blipFill rotWithShape="1">
+          <a:blip r:embed="rId2">
+            <a:alphaModFix amt="20000"/>
+          </a:blip>
+          <a:srcRect l="20444" b="2030"/>
+          <a:stretch/>
+        </p:blipFill>
+        <p:spPr>
+          <a:xfrm>
+            <a:off x="163114" y="159505"/>
+            <a:ext cx="11865771" cy="6538989"/>
+          </a:xfrm>
+          <a:prstGeom prst="rect">
+            <a:avLst/>
+          </a:prstGeom>
+        </p:spPr>
+      </p:pic>
+      <p:sp>
+        <p:nvSpPr>
+          <p:cNvPr id="2" name="Título 1">
+            <a:extLst>
+              <a:ext uri="{FF2B5EF4-FFF2-40B4-BE49-F238E27FC236}">
+                <a16:creationId xmlns:a16="http://schemas.microsoft.com/office/drawing/2014/main" id="{AC62C56E-7B68-12F5-81B2-857F91BD8380}"/>
+              </a:ext>
+            </a:extLst>
+          </p:cNvPr>
+          <p:cNvSpPr>
+            <a:spLocks noGrp="1"/>
+          </p:cNvSpPr>
+          <p:nvPr>
+            <p:ph type="title"/>
+          </p:nvPr>
+        </p:nvSpPr>
+        <p:spPr>
+          <a:xfrm>
+            <a:off x="537068" y="461115"/>
+            <a:ext cx="10134600" cy="828675"/>
+          </a:xfrm>
+        </p:spPr>
+        <p:txBody>
+          <a:bodyPr>
+            <a:normAutofit/>
+          </a:bodyPr>
+          <a:lstStyle/>
+          <a:p>
+            <a:r>
+              <a:rPr lang="es-PE" sz="4400" dirty="0">
+                <a:solidFill>
+                  <a:schemeClr val="tx1"/>
+                </a:solidFill>
+              </a:rPr>
+              <a:t>7.1 </a:t>
+            </a:r>
+            <a:r>
+              <a:rPr lang="es-PE" sz="4400" dirty="0" err="1">
+                <a:solidFill>
+                  <a:schemeClr val="tx1"/>
+                </a:solidFill>
+              </a:rPr>
+              <a:t>Results</a:t>
+            </a:r>
+            <a:endParaRPr lang="es-PE" sz="4400" dirty="0">
+              <a:solidFill>
+                <a:schemeClr val="tx1"/>
+              </a:solidFill>
+            </a:endParaRPr>
+          </a:p>
+        </p:txBody>
+      </p:sp>
+      <p:pic>
+        <p:nvPicPr>
+          <p:cNvPr id="5" name="Marcador de contenido 4" descr="Un dibujo de un coral&#10;&#10;Descripción generada automáticamente con confianza baja">
+            <a:extLst>
+              <a:ext uri="{FF2B5EF4-FFF2-40B4-BE49-F238E27FC236}">
+                <a16:creationId xmlns:a16="http://schemas.microsoft.com/office/drawing/2014/main" id="{E3C00AE9-27E6-5665-8587-386367E3FBEE}"/>
+              </a:ext>
+            </a:extLst>
+          </p:cNvPr>
+          <p:cNvPicPr>
+            <a:picLocks noGrp="1" noChangeAspect="1"/>
+          </p:cNvPicPr>
+          <p:nvPr>
+            <p:ph idx="1"/>
+          </p:nvPr>
+        </p:nvPicPr>
+        <p:blipFill>
+          <a:blip r:embed="rId3">
+            <a:alphaModFix amt="50000"/>
+            <a:extLst>
+              <a:ext uri="{28A0092B-C50C-407E-A947-70E740481C1C}">
+                <a14:useLocalDpi xmlns:a14="http://schemas.microsoft.com/office/drawing/2010/main" val="0"/>
+              </a:ext>
+            </a:extLst>
+          </a:blip>
+          <a:stretch>
+            <a:fillRect/>
+          </a:stretch>
+        </p:blipFill>
+        <p:spPr>
+          <a:xfrm>
+            <a:off x="9406229" y="3890838"/>
+            <a:ext cx="2530878" cy="3129087"/>
+          </a:xfrm>
+        </p:spPr>
+      </p:pic>
+      <p:pic>
+        <p:nvPicPr>
+          <p:cNvPr id="7" name="Imagen 6" descr="Gráfico, Gráfico de líneas&#10;&#10;Descripción generada automáticamente">
+            <a:extLst>
+              <a:ext uri="{FF2B5EF4-FFF2-40B4-BE49-F238E27FC236}">
+                <a16:creationId xmlns:a16="http://schemas.microsoft.com/office/drawing/2014/main" id="{FF8E8194-3735-1D50-FCD2-3424E4B9BF37}"/>
+              </a:ext>
+            </a:extLst>
+          </p:cNvPr>
+          <p:cNvPicPr>
+            <a:picLocks noChangeAspect="1"/>
+          </p:cNvPicPr>
+          <p:nvPr/>
+        </p:nvPicPr>
+        <p:blipFill>
+          <a:blip r:embed="rId4">
+            <a:extLst>
+              <a:ext uri="{28A0092B-C50C-407E-A947-70E740481C1C}">
+                <a14:useLocalDpi xmlns:a14="http://schemas.microsoft.com/office/drawing/2010/main" val="0"/>
+              </a:ext>
+            </a:extLst>
+          </a:blip>
+          <a:stretch>
+            <a:fillRect/>
+          </a:stretch>
+        </p:blipFill>
+        <p:spPr>
+          <a:xfrm>
+            <a:off x="6120148" y="1810138"/>
+            <a:ext cx="5708159" cy="3805439"/>
+          </a:xfrm>
+          <a:prstGeom prst="rect">
+            <a:avLst/>
+          </a:prstGeom>
+        </p:spPr>
+      </p:pic>
+      <p:pic>
+        <p:nvPicPr>
+          <p:cNvPr id="10" name="Imagen 9" descr="Gráfico, Histograma&#10;&#10;Descripción generada automáticamente">
+            <a:extLst>
+              <a:ext uri="{FF2B5EF4-FFF2-40B4-BE49-F238E27FC236}">
+                <a16:creationId xmlns:a16="http://schemas.microsoft.com/office/drawing/2014/main" id="{C7A44826-7C66-A6CB-07F9-374C04E3811C}"/>
+              </a:ext>
+            </a:extLst>
+          </p:cNvPr>
+          <p:cNvPicPr>
+            <a:picLocks noChangeAspect="1"/>
+          </p:cNvPicPr>
+          <p:nvPr/>
+        </p:nvPicPr>
+        <p:blipFill>
+          <a:blip r:embed="rId5">
+            <a:extLst>
+              <a:ext uri="{28A0092B-C50C-407E-A947-70E740481C1C}">
+                <a14:useLocalDpi xmlns:a14="http://schemas.microsoft.com/office/drawing/2010/main" val="0"/>
+              </a:ext>
+            </a:extLst>
+          </a:blip>
+          <a:stretch>
+            <a:fillRect/>
+          </a:stretch>
+        </p:blipFill>
+        <p:spPr>
+          <a:xfrm>
+            <a:off x="320210" y="1810138"/>
+            <a:ext cx="5708159" cy="3805439"/>
+          </a:xfrm>
+          <a:prstGeom prst="rect">
+            <a:avLst/>
+          </a:prstGeom>
+        </p:spPr>
+      </p:pic>
+    </p:spTree>
+    <p:extLst>
+      <p:ext uri="{BB962C8B-B14F-4D97-AF65-F5344CB8AC3E}">
+        <p14:creationId xmlns:p14="http://schemas.microsoft.com/office/powerpoint/2010/main" val="2621911906"/>
+      </p:ext>
+    </p:extLst>
+  </p:cSld>
+  <p:clrMapOvr>
+    <a:masterClrMapping/>
+  </p:clrMapOvr>
+</p:sld>
+</file>
+
+<file path=ppt/slides/slide18.xml><?xml version="1.0" encoding="utf-8"?>
+<p:sld xmlns:a="http://schemas.openxmlformats.org/drawingml/2006/main" xmlns:r="http://schemas.openxmlformats.org/officeDocument/2006/relationships" xmlns:p="http://schemas.openxmlformats.org/presentationml/2006/main">
+  <p:cSld>
+    <p:spTree>
+      <p:nvGrpSpPr>
+        <p:cNvPr id="1" name=""/>
+        <p:cNvGrpSpPr/>
+        <p:nvPr/>
+      </p:nvGrpSpPr>
+      <p:grpSpPr>
+        <a:xfrm>
+          <a:off x="0" y="0"/>
+          <a:ext cx="0" cy="0"/>
+          <a:chOff x="0" y="0"/>
+          <a:chExt cx="0" cy="0"/>
+        </a:xfrm>
+      </p:grpSpPr>
+      <p:pic>
+        <p:nvPicPr>
+          <p:cNvPr id="6" name="Picture 3" descr="Una red de puntos conectados">
+            <a:extLst>
+              <a:ext uri="{FF2B5EF4-FFF2-40B4-BE49-F238E27FC236}">
+                <a16:creationId xmlns:a16="http://schemas.microsoft.com/office/drawing/2014/main" id="{4EC5ED6C-92B5-57B7-9EC6-E40C78E878D0}"/>
+              </a:ext>
+            </a:extLst>
+          </p:cNvPr>
+          <p:cNvPicPr>
+            <a:picLocks noChangeAspect="1"/>
+          </p:cNvPicPr>
+          <p:nvPr/>
+        </p:nvPicPr>
+        <p:blipFill rotWithShape="1">
+          <a:blip r:embed="rId2">
+            <a:alphaModFix amt="20000"/>
+          </a:blip>
+          <a:srcRect l="20444" b="2030"/>
+          <a:stretch/>
+        </p:blipFill>
+        <p:spPr>
+          <a:xfrm>
+            <a:off x="163114" y="159505"/>
+            <a:ext cx="11865771" cy="6538989"/>
+          </a:xfrm>
+          <a:prstGeom prst="rect">
+            <a:avLst/>
+          </a:prstGeom>
+        </p:spPr>
+      </p:pic>
+      <p:sp>
+        <p:nvSpPr>
+          <p:cNvPr id="2" name="Título 1">
+            <a:extLst>
+              <a:ext uri="{FF2B5EF4-FFF2-40B4-BE49-F238E27FC236}">
+                <a16:creationId xmlns:a16="http://schemas.microsoft.com/office/drawing/2014/main" id="{AC62C56E-7B68-12F5-81B2-857F91BD8380}"/>
+              </a:ext>
+            </a:extLst>
+          </p:cNvPr>
+          <p:cNvSpPr>
+            <a:spLocks noGrp="1"/>
+          </p:cNvSpPr>
+          <p:nvPr>
+            <p:ph type="title"/>
+          </p:nvPr>
+        </p:nvSpPr>
+        <p:spPr>
+          <a:xfrm>
+            <a:off x="537068" y="461115"/>
+            <a:ext cx="10134600" cy="828675"/>
+          </a:xfrm>
+        </p:spPr>
+        <p:txBody>
+          <a:bodyPr>
+            <a:normAutofit/>
+          </a:bodyPr>
+          <a:lstStyle/>
+          <a:p>
+            <a:r>
+              <a:rPr lang="es-PE" sz="4400" dirty="0">
+                <a:solidFill>
+                  <a:schemeClr val="tx1"/>
+                </a:solidFill>
+              </a:rPr>
+              <a:t>7.1 </a:t>
+            </a:r>
+            <a:r>
+              <a:rPr lang="es-PE" sz="4400" dirty="0" err="1">
+                <a:solidFill>
+                  <a:schemeClr val="tx1"/>
+                </a:solidFill>
+              </a:rPr>
+              <a:t>Results</a:t>
+            </a:r>
+            <a:endParaRPr lang="es-PE" sz="4400" dirty="0">
+              <a:solidFill>
+                <a:schemeClr val="tx1"/>
+              </a:solidFill>
+            </a:endParaRPr>
+          </a:p>
+        </p:txBody>
+      </p:sp>
+      <p:pic>
+        <p:nvPicPr>
+          <p:cNvPr id="5" name="Marcador de contenido 4" descr="Un dibujo de un coral&#10;&#10;Descripción generada automáticamente con confianza baja">
+            <a:extLst>
+              <a:ext uri="{FF2B5EF4-FFF2-40B4-BE49-F238E27FC236}">
+                <a16:creationId xmlns:a16="http://schemas.microsoft.com/office/drawing/2014/main" id="{E3C00AE9-27E6-5665-8587-386367E3FBEE}"/>
+              </a:ext>
+            </a:extLst>
+          </p:cNvPr>
+          <p:cNvPicPr>
+            <a:picLocks noGrp="1" noChangeAspect="1"/>
+          </p:cNvPicPr>
+          <p:nvPr>
+            <p:ph idx="1"/>
+          </p:nvPr>
+        </p:nvPicPr>
+        <p:blipFill>
+          <a:blip r:embed="rId3">
+            <a:alphaModFix amt="50000"/>
+            <a:extLst>
+              <a:ext uri="{28A0092B-C50C-407E-A947-70E740481C1C}">
+                <a14:useLocalDpi xmlns:a14="http://schemas.microsoft.com/office/drawing/2010/main" val="0"/>
+              </a:ext>
+            </a:extLst>
+          </a:blip>
+          <a:stretch>
+            <a:fillRect/>
+          </a:stretch>
+        </p:blipFill>
+        <p:spPr>
+          <a:xfrm>
+            <a:off x="9406229" y="3890838"/>
+            <a:ext cx="2530878" cy="3129087"/>
+          </a:xfrm>
+        </p:spPr>
+      </p:pic>
+      <p:pic>
+        <p:nvPicPr>
+          <p:cNvPr id="4" name="Imagen 3" descr="Interfaz de usuario gráfica&#10;&#10;Descripción generada automáticamente">
+            <a:extLst>
+              <a:ext uri="{FF2B5EF4-FFF2-40B4-BE49-F238E27FC236}">
+                <a16:creationId xmlns:a16="http://schemas.microsoft.com/office/drawing/2014/main" id="{DBA6D1CB-DE7B-E72A-5617-FE0BBCDB76FD}"/>
+              </a:ext>
+            </a:extLst>
+          </p:cNvPr>
+          <p:cNvPicPr>
+            <a:picLocks noChangeAspect="1"/>
+          </p:cNvPicPr>
+          <p:nvPr/>
+        </p:nvPicPr>
+        <p:blipFill>
+          <a:blip r:embed="rId4">
+            <a:extLst>
+              <a:ext uri="{28A0092B-C50C-407E-A947-70E740481C1C}">
+                <a14:useLocalDpi xmlns:a14="http://schemas.microsoft.com/office/drawing/2010/main" val="0"/>
+              </a:ext>
+            </a:extLst>
+          </a:blip>
+          <a:stretch>
+            <a:fillRect/>
+          </a:stretch>
+        </p:blipFill>
+        <p:spPr>
+          <a:xfrm>
+            <a:off x="600119" y="1145418"/>
+            <a:ext cx="5504952" cy="5504952"/>
+          </a:xfrm>
+          <a:prstGeom prst="rect">
+            <a:avLst/>
+          </a:prstGeom>
+        </p:spPr>
+      </p:pic>
+      <p:pic>
+        <p:nvPicPr>
+          <p:cNvPr id="9" name="Imagen 8" descr="Pantalla de video juego&#10;&#10;Descripción generada automáticamente con confianza media">
+            <a:extLst>
+              <a:ext uri="{FF2B5EF4-FFF2-40B4-BE49-F238E27FC236}">
+                <a16:creationId xmlns:a16="http://schemas.microsoft.com/office/drawing/2014/main" id="{434EC9A9-BDD4-3603-E5B9-5DD886627853}"/>
+              </a:ext>
+            </a:extLst>
+          </p:cNvPr>
+          <p:cNvPicPr>
+            <a:picLocks noChangeAspect="1"/>
+          </p:cNvPicPr>
+          <p:nvPr/>
+        </p:nvPicPr>
+        <p:blipFill>
+          <a:blip r:embed="rId5">
+            <a:extLst>
+              <a:ext uri="{28A0092B-C50C-407E-A947-70E740481C1C}">
+                <a14:useLocalDpi xmlns:a14="http://schemas.microsoft.com/office/drawing/2010/main" val="0"/>
+              </a:ext>
+            </a:extLst>
+          </a:blip>
+          <a:stretch>
+            <a:fillRect/>
+          </a:stretch>
+        </p:blipFill>
+        <p:spPr>
+          <a:xfrm>
+            <a:off x="6105071" y="1145418"/>
+            <a:ext cx="5504952" cy="5504952"/>
+          </a:xfrm>
+          <a:prstGeom prst="rect">
+            <a:avLst/>
+          </a:prstGeom>
+        </p:spPr>
+      </p:pic>
+    </p:spTree>
+    <p:extLst>
+      <p:ext uri="{BB962C8B-B14F-4D97-AF65-F5344CB8AC3E}">
+        <p14:creationId xmlns:p14="http://schemas.microsoft.com/office/powerpoint/2010/main" val="3107354995"/>
+      </p:ext>
+    </p:extLst>
+  </p:cSld>
+  <p:clrMapOvr>
+    <a:masterClrMapping/>
+  </p:clrMapOvr>
+</p:sld>
+</file>
+
+<file path=ppt/slides/slide19.xml><?xml version="1.0" encoding="utf-8"?>
+<p:sld xmlns:a="http://schemas.openxmlformats.org/drawingml/2006/main" xmlns:r="http://schemas.openxmlformats.org/officeDocument/2006/relationships" xmlns:p="http://schemas.openxmlformats.org/presentationml/2006/main">
+  <p:cSld>
+    <p:spTree>
+      <p:nvGrpSpPr>
+        <p:cNvPr id="1" name=""/>
+        <p:cNvGrpSpPr/>
+        <p:nvPr/>
+      </p:nvGrpSpPr>
+      <p:grpSpPr>
+        <a:xfrm>
+          <a:off x="0" y="0"/>
+          <a:ext cx="0" cy="0"/>
+          <a:chOff x="0" y="0"/>
+          <a:chExt cx="0" cy="0"/>
+        </a:xfrm>
+      </p:grpSpPr>
+      <p:pic>
+        <p:nvPicPr>
+          <p:cNvPr id="6" name="Picture 3" descr="Una red de puntos conectados">
+            <a:extLst>
+              <a:ext uri="{FF2B5EF4-FFF2-40B4-BE49-F238E27FC236}">
+                <a16:creationId xmlns:a16="http://schemas.microsoft.com/office/drawing/2014/main" id="{4EC5ED6C-92B5-57B7-9EC6-E40C78E878D0}"/>
+              </a:ext>
+            </a:extLst>
+          </p:cNvPr>
+          <p:cNvPicPr>
+            <a:picLocks noChangeAspect="1"/>
+          </p:cNvPicPr>
+          <p:nvPr/>
+        </p:nvPicPr>
+        <p:blipFill rotWithShape="1">
+          <a:blip r:embed="rId2">
+            <a:alphaModFix amt="20000"/>
+          </a:blip>
+          <a:srcRect l="20444" b="2030"/>
+          <a:stretch/>
+        </p:blipFill>
+        <p:spPr>
+          <a:xfrm>
+            <a:off x="163114" y="159505"/>
+            <a:ext cx="11865771" cy="6538989"/>
+          </a:xfrm>
+          <a:prstGeom prst="rect">
+            <a:avLst/>
+          </a:prstGeom>
+        </p:spPr>
+      </p:pic>
+      <p:sp>
+        <p:nvSpPr>
+          <p:cNvPr id="2" name="Título 1">
+            <a:extLst>
+              <a:ext uri="{FF2B5EF4-FFF2-40B4-BE49-F238E27FC236}">
+                <a16:creationId xmlns:a16="http://schemas.microsoft.com/office/drawing/2014/main" id="{AC62C56E-7B68-12F5-81B2-857F91BD8380}"/>
+              </a:ext>
+            </a:extLst>
+          </p:cNvPr>
+          <p:cNvSpPr>
+            <a:spLocks noGrp="1"/>
+          </p:cNvSpPr>
+          <p:nvPr>
+            <p:ph type="title"/>
+          </p:nvPr>
+        </p:nvSpPr>
+        <p:spPr>
+          <a:xfrm>
+            <a:off x="537068" y="461115"/>
+            <a:ext cx="10134600" cy="828675"/>
+          </a:xfrm>
+        </p:spPr>
+        <p:txBody>
+          <a:bodyPr>
+            <a:normAutofit/>
+          </a:bodyPr>
+          <a:lstStyle/>
+          <a:p>
+            <a:r>
+              <a:rPr lang="es-PE" sz="4400" dirty="0">
+                <a:solidFill>
+                  <a:schemeClr val="tx1"/>
+                </a:solidFill>
+              </a:rPr>
+              <a:t>6.3 </a:t>
+            </a:r>
+            <a:r>
+              <a:rPr lang="es-PE" sz="4400" dirty="0" err="1">
+                <a:solidFill>
+                  <a:schemeClr val="tx1"/>
+                </a:solidFill>
+              </a:rPr>
+              <a:t>Results</a:t>
+            </a:r>
+            <a:r>
+              <a:rPr lang="es-PE" sz="4400" dirty="0">
+                <a:solidFill>
+                  <a:schemeClr val="tx1"/>
+                </a:solidFill>
+              </a:rPr>
+              <a:t> </a:t>
+            </a:r>
+            <a:r>
+              <a:rPr lang="es-PE" sz="4400" dirty="0" err="1">
+                <a:solidFill>
+                  <a:schemeClr val="tx1"/>
+                </a:solidFill>
+              </a:rPr>
+              <a:t>with</a:t>
+            </a:r>
+            <a:r>
+              <a:rPr lang="es-PE" sz="4400" dirty="0">
+                <a:solidFill>
+                  <a:schemeClr val="tx1"/>
+                </a:solidFill>
+              </a:rPr>
+              <a:t> </a:t>
+            </a:r>
+            <a:r>
+              <a:rPr lang="es-PE" sz="4400" dirty="0" err="1">
+                <a:solidFill>
+                  <a:schemeClr val="tx1"/>
+                </a:solidFill>
+              </a:rPr>
+              <a:t>Streamlit</a:t>
+            </a:r>
+            <a:r>
+              <a:rPr lang="es-PE" sz="4400" dirty="0">
+                <a:solidFill>
+                  <a:schemeClr val="tx1"/>
+                </a:solidFill>
+              </a:rPr>
+              <a:t> and </a:t>
+            </a:r>
+            <a:r>
+              <a:rPr lang="es-PE" sz="4400" dirty="0" err="1">
+                <a:solidFill>
+                  <a:schemeClr val="tx1"/>
+                </a:solidFill>
+              </a:rPr>
+              <a:t>FastAPI</a:t>
+            </a:r>
+            <a:endParaRPr lang="es-PE" sz="4400" dirty="0">
+              <a:solidFill>
+                <a:schemeClr val="tx1"/>
+              </a:solidFill>
+            </a:endParaRPr>
+          </a:p>
+        </p:txBody>
+      </p:sp>
+      <p:pic>
+        <p:nvPicPr>
+          <p:cNvPr id="5" name="Marcador de contenido 4" descr="Un dibujo de un coral&#10;&#10;Descripción generada automáticamente con confianza baja">
+            <a:extLst>
+              <a:ext uri="{FF2B5EF4-FFF2-40B4-BE49-F238E27FC236}">
+                <a16:creationId xmlns:a16="http://schemas.microsoft.com/office/drawing/2014/main" id="{E3C00AE9-27E6-5665-8587-386367E3FBEE}"/>
+              </a:ext>
+            </a:extLst>
+          </p:cNvPr>
+          <p:cNvPicPr>
+            <a:picLocks noGrp="1" noChangeAspect="1"/>
+          </p:cNvPicPr>
+          <p:nvPr>
+            <p:ph idx="1"/>
+          </p:nvPr>
+        </p:nvPicPr>
+        <p:blipFill>
+          <a:blip r:embed="rId3">
+            <a:alphaModFix amt="50000"/>
+            <a:extLst>
+              <a:ext uri="{28A0092B-C50C-407E-A947-70E740481C1C}">
+                <a14:useLocalDpi xmlns:a14="http://schemas.microsoft.com/office/drawing/2010/main" val="0"/>
+              </a:ext>
+            </a:extLst>
+          </a:blip>
+          <a:stretch>
+            <a:fillRect/>
+          </a:stretch>
+        </p:blipFill>
+        <p:spPr>
+          <a:xfrm>
+            <a:off x="9406229" y="3890838"/>
+            <a:ext cx="2530878" cy="3129087"/>
+          </a:xfrm>
+        </p:spPr>
+      </p:pic>
+      <p:pic>
+        <p:nvPicPr>
+          <p:cNvPr id="4" name="Imagen 3">
+            <a:extLst>
+              <a:ext uri="{FF2B5EF4-FFF2-40B4-BE49-F238E27FC236}">
+                <a16:creationId xmlns:a16="http://schemas.microsoft.com/office/drawing/2014/main" id="{D83CA2A1-D5CF-69C7-2AF0-978B7FB42F70}"/>
+              </a:ext>
+            </a:extLst>
+          </p:cNvPr>
+          <p:cNvPicPr>
+            <a:picLocks noChangeAspect="1"/>
+          </p:cNvPicPr>
+          <p:nvPr/>
+        </p:nvPicPr>
+        <p:blipFill>
+          <a:blip r:embed="rId4"/>
+          <a:stretch>
+            <a:fillRect/>
+          </a:stretch>
+        </p:blipFill>
+        <p:spPr>
+          <a:xfrm>
+            <a:off x="2782217" y="1333842"/>
+            <a:ext cx="6624012" cy="5320600"/>
+          </a:xfrm>
+          <a:prstGeom prst="rect">
+            <a:avLst/>
+          </a:prstGeom>
+        </p:spPr>
+      </p:pic>
+    </p:spTree>
+    <p:extLst>
+      <p:ext uri="{BB962C8B-B14F-4D97-AF65-F5344CB8AC3E}">
+        <p14:creationId xmlns:p14="http://schemas.microsoft.com/office/powerpoint/2010/main" val="724132246"/>
+      </p:ext>
+    </p:extLst>
+  </p:cSld>
+  <p:clrMapOvr>
+    <a:masterClrMapping/>
+  </p:clrMapOvr>
+</p:sld>
+</file>
+
 <file path=ppt/slides/slide2.xml><?xml version="1.0" encoding="utf-8"?>
 <p:sld xmlns:a="http://schemas.openxmlformats.org/drawingml/2006/main" xmlns:r="http://schemas.openxmlformats.org/officeDocument/2006/relationships" xmlns:p="http://schemas.openxmlformats.org/presentationml/2006/main">
   <p:cSld>
@@ -4839,24 +7417,6 @@
             </a:r>
           </a:p>
           <a:p>
-            <a:pPr marL="457200" indent="-457200">
-              <a:buFont typeface="+mj-lt"/>
-              <a:buAutoNum type="alphaLcParenR"/>
-            </a:pPr>
-            <a:r>
-              <a:rPr lang="es-PE" sz="2400" dirty="0">
-                <a:solidFill>
-                  <a:schemeClr val="tx1"/>
-                </a:solidFill>
-              </a:rPr>
-              <a:t> …</a:t>
-            </a:r>
-          </a:p>
-          <a:p>
-            <a:pPr marL="457200" indent="-457200">
-              <a:buFont typeface="+mj-lt"/>
-              <a:buAutoNum type="alphaLcParenR"/>
-            </a:pPr>
             <a:endParaRPr lang="es-PE" sz="2400" dirty="0">
               <a:solidFill>
                 <a:schemeClr val="tx1"/>
@@ -5433,7 +7993,7 @@
                   <a:schemeClr val="tx1"/>
                 </a:solidFill>
               </a:rPr>
-              <a:t>4. IMPLEMENTATIONS TECHNIQUES</a:t>
+              <a:t>4. GITHUB REPOSITORY LINK</a:t>
             </a:r>
           </a:p>
         </p:txBody>
@@ -5476,121 +8036,101 @@
       </p:pic>
       <p:sp>
         <p:nvSpPr>
-          <p:cNvPr id="7" name="Título 1">
-            <a:extLst>
-              <a:ext uri="{FF2B5EF4-FFF2-40B4-BE49-F238E27FC236}">
-                <a16:creationId xmlns:a16="http://schemas.microsoft.com/office/drawing/2014/main" id="{D73F1781-0D6B-82C4-3A81-100BF5A5FCB1}"/>
-              </a:ext>
-            </a:extLst>
-          </p:cNvPr>
-          <p:cNvSpPr txBox="1">
-            <a:spLocks/>
-          </p:cNvSpPr>
+          <p:cNvPr id="16" name="CuadroTexto 15">
+            <a:extLst>
+              <a:ext uri="{FF2B5EF4-FFF2-40B4-BE49-F238E27FC236}">
+                <a16:creationId xmlns:a16="http://schemas.microsoft.com/office/drawing/2014/main" id="{90EB6D43-5F05-6D1B-1027-12C72286531F}"/>
+              </a:ext>
+            </a:extLst>
+          </p:cNvPr>
+          <p:cNvSpPr txBox="1"/>
           <p:nvPr/>
         </p:nvSpPr>
         <p:spPr>
           <a:xfrm>
-            <a:off x="1028700" y="1891274"/>
-            <a:ext cx="10134600" cy="1887624"/>
+            <a:off x="1312454" y="1641501"/>
+            <a:ext cx="9725025" cy="1200329"/>
           </a:xfrm>
           <a:prstGeom prst="rect">
             <a:avLst/>
           </a:prstGeom>
-        </p:spPr>
-        <p:txBody>
-          <a:bodyPr vert="horz" lIns="91440" tIns="45720" rIns="91440" bIns="45720" rtlCol="0" anchor="b">
-            <a:normAutofit/>
+          <a:noFill/>
+        </p:spPr>
+        <p:txBody>
+          <a:bodyPr wrap="square" rtlCol="0">
+            <a:spAutoFit/>
           </a:bodyPr>
-          <a:lstStyle>
-            <a:lvl1pPr algn="l" defTabSz="914400" rtl="0" eaLnBrk="1" latinLnBrk="0" hangingPunct="1">
-              <a:lnSpc>
-                <a:spcPct val="110000"/>
-              </a:lnSpc>
-              <a:spcBef>
-                <a:spcPct val="0"/>
-              </a:spcBef>
-              <a:buNone/>
-              <a:defRPr sz="3200" kern="1200" cap="none" baseline="0">
-                <a:solidFill>
-                  <a:schemeClr val="tx2"/>
-                </a:solidFill>
-                <a:latin typeface="+mj-lt"/>
-                <a:ea typeface="+mj-ea"/>
-                <a:cs typeface="+mj-cs"/>
-              </a:defRPr>
-            </a:lvl1pPr>
-          </a:lstStyle>
-          <a:p>
-            <a:pPr marL="457200" indent="-457200">
-              <a:buFont typeface="+mj-lt"/>
-              <a:buAutoNum type="alphaLcParenR"/>
-            </a:pPr>
-            <a:r>
-              <a:rPr lang="en-US" sz="2400" dirty="0">
-                <a:solidFill>
-                  <a:schemeClr val="tx1"/>
-                </a:solidFill>
+          <a:lstStyle/>
+          <a:p>
+            <a:r>
+              <a:rPr lang="es-PE" dirty="0" err="1"/>
+              <a:t>This</a:t>
+            </a:r>
+            <a:r>
+              <a:rPr lang="es-PE" dirty="0"/>
+              <a:t> </a:t>
+            </a:r>
+            <a:r>
+              <a:rPr lang="es-PE" dirty="0" err="1"/>
+              <a:t>is</a:t>
+            </a:r>
+            <a:r>
+              <a:rPr lang="es-PE" dirty="0"/>
+              <a:t> </a:t>
+            </a:r>
+            <a:r>
+              <a:rPr lang="es-PE" dirty="0" err="1"/>
+              <a:t>the</a:t>
+            </a:r>
+            <a:r>
+              <a:rPr lang="es-PE" dirty="0"/>
+              <a:t> link </a:t>
+            </a:r>
+            <a:r>
+              <a:rPr lang="es-PE" dirty="0" err="1"/>
+              <a:t>of</a:t>
+            </a:r>
+            <a:r>
+              <a:rPr lang="es-PE" dirty="0"/>
+              <a:t> </a:t>
+            </a:r>
+            <a:r>
+              <a:rPr lang="es-PE" dirty="0" err="1"/>
+              <a:t>the</a:t>
+            </a:r>
+            <a:r>
+              <a:rPr lang="es-PE" dirty="0"/>
+              <a:t> </a:t>
+            </a:r>
+            <a:r>
+              <a:rPr lang="es-PE" dirty="0" err="1"/>
+              <a:t>repository</a:t>
+            </a:r>
+            <a:r>
+              <a:rPr lang="es-PE" dirty="0"/>
+              <a:t>:</a:t>
+            </a:r>
+          </a:p>
+          <a:p>
+            <a:endParaRPr lang="es-PE" dirty="0"/>
+          </a:p>
+          <a:p>
+            <a:r>
+              <a:rPr lang="es-PE" dirty="0">
+                <a:hlinkClick r:id="rId4"/>
               </a:rPr>
-              <a:t>CNN Resnet</a:t>
-            </a:r>
-          </a:p>
-          <a:p>
-            <a:pPr marL="457200" indent="-457200">
-              <a:buFont typeface="+mj-lt"/>
-              <a:buAutoNum type="alphaLcParenR"/>
-            </a:pPr>
-            <a:r>
-              <a:rPr lang="en-US" sz="2400" dirty="0" err="1">
-                <a:solidFill>
-                  <a:schemeClr val="tx1"/>
-                </a:solidFill>
-              </a:rPr>
-              <a:t>FastAPI</a:t>
-            </a:r>
-            <a:endParaRPr lang="en-US" sz="2400" dirty="0">
-              <a:solidFill>
-                <a:schemeClr val="tx1"/>
-              </a:solidFill>
-            </a:endParaRPr>
-          </a:p>
-          <a:p>
-            <a:pPr marL="457200" indent="-457200">
-              <a:buFont typeface="+mj-lt"/>
-              <a:buAutoNum type="alphaLcParenR"/>
-            </a:pPr>
-            <a:r>
-              <a:rPr lang="en-US" sz="2400" dirty="0" err="1">
-                <a:solidFill>
-                  <a:schemeClr val="tx1"/>
-                </a:solidFill>
-              </a:rPr>
-              <a:t>Streamlit</a:t>
-            </a:r>
-            <a:endParaRPr lang="en-US" sz="2400" dirty="0">
-              <a:solidFill>
-                <a:schemeClr val="tx1"/>
-              </a:solidFill>
-            </a:endParaRPr>
-          </a:p>
-          <a:p>
-            <a:pPr marL="457200" indent="-457200">
-              <a:buFont typeface="+mj-lt"/>
-              <a:buAutoNum type="alphaLcParenR"/>
-            </a:pPr>
-            <a:endParaRPr lang="es-PE" sz="2400" dirty="0">
-              <a:solidFill>
-                <a:schemeClr val="tx1"/>
-              </a:solidFill>
-            </a:endParaRPr>
+              <a:t>https://github.com/JoaquinAyzanoa/PortafolioJA/tree/e96351fa14b03b0788fd2a7d78b996a5b3a9c38d/Fracture%20Bone%20Detection</a:t>
+            </a:r>
+            <a:endParaRPr lang="es-PE" dirty="0"/>
           </a:p>
         </p:txBody>
       </p:sp>
       <p:pic>
         <p:nvPicPr>
-          <p:cNvPr id="1026" name="Picture 2" descr="Overview of Residual Neural Network (ResNet)">
-            <a:extLst>
-              <a:ext uri="{FF2B5EF4-FFF2-40B4-BE49-F238E27FC236}">
-                <a16:creationId xmlns:a16="http://schemas.microsoft.com/office/drawing/2014/main" id="{B1D94EA9-5A29-A55F-679F-C868DFC3D874}"/>
+          <p:cNvPr id="19" name="Picture 2" descr="What is GitHub? — Pythia Foundations">
+            <a:extLst>
+              <a:ext uri="{FF2B5EF4-FFF2-40B4-BE49-F238E27FC236}">
+                <a16:creationId xmlns:a16="http://schemas.microsoft.com/office/drawing/2014/main" id="{B912A7F6-7D0E-2EFF-AC9B-23464C0076AF}"/>
               </a:ext>
             </a:extLst>
           </p:cNvPr>
@@ -5600,7 +8140,7 @@
           <p:nvPr/>
         </p:nvPicPr>
         <p:blipFill>
-          <a:blip r:embed="rId4">
+          <a:blip r:embed="rId5">
             <a:extLst>
               <a:ext uri="{28A0092B-C50C-407E-A947-70E740481C1C}">
                 <a14:useLocalDpi xmlns:a14="http://schemas.microsoft.com/office/drawing/2010/main" val="0"/>
@@ -5614,8 +8154,8 @@
         </p:blipFill>
         <p:spPr bwMode="auto">
           <a:xfrm>
-            <a:off x="1865923" y="3274156"/>
-            <a:ext cx="8805745" cy="2650393"/>
+            <a:off x="3314588" y="2930756"/>
+            <a:ext cx="5562823" cy="3129088"/>
           </a:xfrm>
           <a:prstGeom prst="rect">
             <a:avLst/>
@@ -5636,6 +8176,1161 @@
     <p:extLst>
       <p:ext uri="{BB962C8B-B14F-4D97-AF65-F5344CB8AC3E}">
         <p14:creationId xmlns:p14="http://schemas.microsoft.com/office/powerpoint/2010/main" val="2632297096"/>
+      </p:ext>
+    </p:extLst>
+  </p:cSld>
+  <p:clrMapOvr>
+    <a:masterClrMapping/>
+  </p:clrMapOvr>
+</p:sld>
+</file>
+
+<file path=ppt/slides/slide6.xml><?xml version="1.0" encoding="utf-8"?>
+<p:sld xmlns:a="http://schemas.openxmlformats.org/drawingml/2006/main" xmlns:r="http://schemas.openxmlformats.org/officeDocument/2006/relationships" xmlns:p="http://schemas.openxmlformats.org/presentationml/2006/main">
+  <p:cSld>
+    <p:spTree>
+      <p:nvGrpSpPr>
+        <p:cNvPr id="1" name=""/>
+        <p:cNvGrpSpPr/>
+        <p:nvPr/>
+      </p:nvGrpSpPr>
+      <p:grpSpPr>
+        <a:xfrm>
+          <a:off x="0" y="0"/>
+          <a:ext cx="0" cy="0"/>
+          <a:chOff x="0" y="0"/>
+          <a:chExt cx="0" cy="0"/>
+        </a:xfrm>
+      </p:grpSpPr>
+      <p:pic>
+        <p:nvPicPr>
+          <p:cNvPr id="6" name="Picture 3" descr="Una red de puntos conectados">
+            <a:extLst>
+              <a:ext uri="{FF2B5EF4-FFF2-40B4-BE49-F238E27FC236}">
+                <a16:creationId xmlns:a16="http://schemas.microsoft.com/office/drawing/2014/main" id="{4EC5ED6C-92B5-57B7-9EC6-E40C78E878D0}"/>
+              </a:ext>
+            </a:extLst>
+          </p:cNvPr>
+          <p:cNvPicPr>
+            <a:picLocks noChangeAspect="1"/>
+          </p:cNvPicPr>
+          <p:nvPr/>
+        </p:nvPicPr>
+        <p:blipFill rotWithShape="1">
+          <a:blip r:embed="rId2">
+            <a:alphaModFix amt="20000"/>
+          </a:blip>
+          <a:srcRect l="20444" b="2030"/>
+          <a:stretch/>
+        </p:blipFill>
+        <p:spPr>
+          <a:xfrm>
+            <a:off x="163114" y="159505"/>
+            <a:ext cx="11865771" cy="6538989"/>
+          </a:xfrm>
+          <a:prstGeom prst="rect">
+            <a:avLst/>
+          </a:prstGeom>
+        </p:spPr>
+      </p:pic>
+      <p:sp>
+        <p:nvSpPr>
+          <p:cNvPr id="2" name="Título 1">
+            <a:extLst>
+              <a:ext uri="{FF2B5EF4-FFF2-40B4-BE49-F238E27FC236}">
+                <a16:creationId xmlns:a16="http://schemas.microsoft.com/office/drawing/2014/main" id="{AC62C56E-7B68-12F5-81B2-857F91BD8380}"/>
+              </a:ext>
+            </a:extLst>
+          </p:cNvPr>
+          <p:cNvSpPr>
+            <a:spLocks noGrp="1"/>
+          </p:cNvSpPr>
+          <p:nvPr>
+            <p:ph type="title"/>
+          </p:nvPr>
+        </p:nvSpPr>
+        <p:spPr>
+          <a:xfrm>
+            <a:off x="1028700" y="723900"/>
+            <a:ext cx="10134600" cy="828675"/>
+          </a:xfrm>
+        </p:spPr>
+        <p:txBody>
+          <a:bodyPr>
+            <a:normAutofit/>
+          </a:bodyPr>
+          <a:lstStyle/>
+          <a:p>
+            <a:r>
+              <a:rPr lang="es-PE" sz="4400" dirty="0">
+                <a:solidFill>
+                  <a:schemeClr val="tx1"/>
+                </a:solidFill>
+              </a:rPr>
+              <a:t>5. RESNET MODEL</a:t>
+            </a:r>
+          </a:p>
+        </p:txBody>
+      </p:sp>
+      <p:pic>
+        <p:nvPicPr>
+          <p:cNvPr id="5" name="Marcador de contenido 4" descr="Un dibujo de un coral&#10;&#10;Descripción generada automáticamente con confianza baja">
+            <a:extLst>
+              <a:ext uri="{FF2B5EF4-FFF2-40B4-BE49-F238E27FC236}">
+                <a16:creationId xmlns:a16="http://schemas.microsoft.com/office/drawing/2014/main" id="{E3C00AE9-27E6-5665-8587-386367E3FBEE}"/>
+              </a:ext>
+            </a:extLst>
+          </p:cNvPr>
+          <p:cNvPicPr>
+            <a:picLocks noGrp="1" noChangeAspect="1"/>
+          </p:cNvPicPr>
+          <p:nvPr>
+            <p:ph idx="1"/>
+          </p:nvPr>
+        </p:nvPicPr>
+        <p:blipFill>
+          <a:blip r:embed="rId3">
+            <a:alphaModFix amt="50000"/>
+            <a:extLst>
+              <a:ext uri="{28A0092B-C50C-407E-A947-70E740481C1C}">
+                <a14:useLocalDpi xmlns:a14="http://schemas.microsoft.com/office/drawing/2010/main" val="0"/>
+              </a:ext>
+            </a:extLst>
+          </a:blip>
+          <a:stretch>
+            <a:fillRect/>
+          </a:stretch>
+        </p:blipFill>
+        <p:spPr>
+          <a:xfrm>
+            <a:off x="9406229" y="3890838"/>
+            <a:ext cx="2530878" cy="3129087"/>
+          </a:xfrm>
+        </p:spPr>
+      </p:pic>
+      <p:pic>
+        <p:nvPicPr>
+          <p:cNvPr id="13" name="Imagen 12">
+            <a:extLst>
+              <a:ext uri="{FF2B5EF4-FFF2-40B4-BE49-F238E27FC236}">
+                <a16:creationId xmlns:a16="http://schemas.microsoft.com/office/drawing/2014/main" id="{9A1F42B8-E80B-7913-8E25-06747D54803C}"/>
+              </a:ext>
+            </a:extLst>
+          </p:cNvPr>
+          <p:cNvPicPr>
+            <a:picLocks noChangeAspect="1"/>
+          </p:cNvPicPr>
+          <p:nvPr/>
+        </p:nvPicPr>
+        <p:blipFill>
+          <a:blip r:embed="rId4"/>
+          <a:stretch>
+            <a:fillRect/>
+          </a:stretch>
+        </p:blipFill>
+        <p:spPr>
+          <a:xfrm>
+            <a:off x="1388654" y="2748720"/>
+            <a:ext cx="2513863" cy="3314986"/>
+          </a:xfrm>
+          <a:prstGeom prst="rect">
+            <a:avLst/>
+          </a:prstGeom>
+        </p:spPr>
+      </p:pic>
+      <p:pic>
+        <p:nvPicPr>
+          <p:cNvPr id="15" name="Imagen 14">
+            <a:extLst>
+              <a:ext uri="{FF2B5EF4-FFF2-40B4-BE49-F238E27FC236}">
+                <a16:creationId xmlns:a16="http://schemas.microsoft.com/office/drawing/2014/main" id="{89CD2C80-6A37-9411-9A8C-9E5BAC5EEB6E}"/>
+              </a:ext>
+            </a:extLst>
+          </p:cNvPr>
+          <p:cNvPicPr>
+            <a:picLocks noChangeAspect="1"/>
+          </p:cNvPicPr>
+          <p:nvPr/>
+        </p:nvPicPr>
+        <p:blipFill>
+          <a:blip r:embed="rId5"/>
+          <a:stretch>
+            <a:fillRect/>
+          </a:stretch>
+        </p:blipFill>
+        <p:spPr>
+          <a:xfrm>
+            <a:off x="4393802" y="2748720"/>
+            <a:ext cx="1508891" cy="3314987"/>
+          </a:xfrm>
+          <a:prstGeom prst="rect">
+            <a:avLst/>
+          </a:prstGeom>
+        </p:spPr>
+      </p:pic>
+      <p:sp>
+        <p:nvSpPr>
+          <p:cNvPr id="16" name="CuadroTexto 15">
+            <a:extLst>
+              <a:ext uri="{FF2B5EF4-FFF2-40B4-BE49-F238E27FC236}">
+                <a16:creationId xmlns:a16="http://schemas.microsoft.com/office/drawing/2014/main" id="{90EB6D43-5F05-6D1B-1027-12C72286531F}"/>
+              </a:ext>
+            </a:extLst>
+          </p:cNvPr>
+          <p:cNvSpPr txBox="1"/>
+          <p:nvPr/>
+        </p:nvSpPr>
+        <p:spPr>
+          <a:xfrm>
+            <a:off x="1312454" y="1641501"/>
+            <a:ext cx="9725025" cy="646331"/>
+          </a:xfrm>
+          <a:prstGeom prst="rect">
+            <a:avLst/>
+          </a:prstGeom>
+          <a:noFill/>
+        </p:spPr>
+        <p:txBody>
+          <a:bodyPr wrap="square" rtlCol="0">
+            <a:spAutoFit/>
+          </a:bodyPr>
+          <a:lstStyle/>
+          <a:p>
+            <a:r>
+              <a:rPr lang="es-PE" dirty="0" err="1"/>
+              <a:t>The</a:t>
+            </a:r>
+            <a:r>
+              <a:rPr lang="es-PE" dirty="0"/>
+              <a:t> </a:t>
+            </a:r>
+            <a:r>
+              <a:rPr lang="es-PE" dirty="0" err="1"/>
+              <a:t>Resnet</a:t>
+            </a:r>
+            <a:r>
+              <a:rPr lang="es-PE" dirty="0"/>
+              <a:t> </a:t>
+            </a:r>
+            <a:r>
+              <a:rPr lang="es-PE" dirty="0" err="1"/>
+              <a:t>model</a:t>
+            </a:r>
+            <a:r>
+              <a:rPr lang="es-PE" dirty="0"/>
+              <a:t> </a:t>
+            </a:r>
+            <a:r>
+              <a:rPr lang="es-PE" dirty="0" err="1"/>
+              <a:t>was</a:t>
+            </a:r>
+            <a:r>
+              <a:rPr lang="es-PE" dirty="0"/>
+              <a:t> </a:t>
+            </a:r>
+            <a:r>
+              <a:rPr lang="es-PE" dirty="0" err="1"/>
+              <a:t>created</a:t>
+            </a:r>
+            <a:r>
+              <a:rPr lang="es-PE" dirty="0"/>
+              <a:t> </a:t>
+            </a:r>
+            <a:r>
+              <a:rPr lang="es-PE" dirty="0" err="1"/>
+              <a:t>from</a:t>
+            </a:r>
+            <a:r>
+              <a:rPr lang="es-PE" dirty="0"/>
+              <a:t> </a:t>
+            </a:r>
+            <a:r>
+              <a:rPr lang="es-PE" dirty="0" err="1"/>
+              <a:t>scratch</a:t>
+            </a:r>
+            <a:r>
+              <a:rPr lang="es-PE" dirty="0"/>
+              <a:t> </a:t>
+            </a:r>
+            <a:r>
+              <a:rPr lang="es-PE" dirty="0" err="1"/>
+              <a:t>using</a:t>
+            </a:r>
+            <a:r>
+              <a:rPr lang="es-PE" dirty="0"/>
+              <a:t> </a:t>
+            </a:r>
+            <a:r>
+              <a:rPr lang="es-PE" dirty="0" err="1"/>
+              <a:t>pytorch</a:t>
+            </a:r>
+            <a:r>
+              <a:rPr lang="es-PE" dirty="0"/>
+              <a:t>, no </a:t>
+            </a:r>
+            <a:r>
+              <a:rPr lang="es-PE" dirty="0" err="1"/>
+              <a:t>pretrained</a:t>
+            </a:r>
+            <a:r>
+              <a:rPr lang="es-PE" dirty="0"/>
+              <a:t> </a:t>
+            </a:r>
+            <a:r>
+              <a:rPr lang="es-PE" dirty="0" err="1"/>
+              <a:t>model</a:t>
+            </a:r>
+            <a:r>
+              <a:rPr lang="es-PE" dirty="0"/>
+              <a:t> </a:t>
+            </a:r>
+            <a:r>
+              <a:rPr lang="es-PE" dirty="0" err="1"/>
+              <a:t>or</a:t>
+            </a:r>
+            <a:r>
+              <a:rPr lang="es-PE" dirty="0"/>
+              <a:t> </a:t>
+            </a:r>
+            <a:r>
+              <a:rPr lang="es-PE" dirty="0" err="1"/>
+              <a:t>downloaded</a:t>
+            </a:r>
+            <a:r>
+              <a:rPr lang="es-PE" dirty="0"/>
+              <a:t> </a:t>
+            </a:r>
+            <a:r>
+              <a:rPr lang="es-PE" dirty="0" err="1"/>
+              <a:t>model</a:t>
+            </a:r>
+            <a:r>
+              <a:rPr lang="es-PE" dirty="0"/>
+              <a:t> </a:t>
+            </a:r>
+            <a:r>
+              <a:rPr lang="es-PE" dirty="0" err="1"/>
+              <a:t>was</a:t>
+            </a:r>
+            <a:r>
+              <a:rPr lang="es-PE" dirty="0"/>
+              <a:t> </a:t>
+            </a:r>
+            <a:r>
+              <a:rPr lang="es-PE" dirty="0" err="1"/>
+              <a:t>used</a:t>
+            </a:r>
+            <a:r>
+              <a:rPr lang="es-PE" dirty="0"/>
+              <a:t> </a:t>
+            </a:r>
+            <a:r>
+              <a:rPr lang="es-PE" dirty="0" err="1"/>
+              <a:t>here</a:t>
+            </a:r>
+            <a:r>
+              <a:rPr lang="es-PE" dirty="0"/>
+              <a:t>.</a:t>
+            </a:r>
+          </a:p>
+        </p:txBody>
+      </p:sp>
+      <p:pic>
+        <p:nvPicPr>
+          <p:cNvPr id="18" name="Imagen 17">
+            <a:extLst>
+              <a:ext uri="{FF2B5EF4-FFF2-40B4-BE49-F238E27FC236}">
+                <a16:creationId xmlns:a16="http://schemas.microsoft.com/office/drawing/2014/main" id="{B7FD7781-F319-9C06-BFA6-071ADE7672A2}"/>
+              </a:ext>
+            </a:extLst>
+          </p:cNvPr>
+          <p:cNvPicPr>
+            <a:picLocks noChangeAspect="1"/>
+          </p:cNvPicPr>
+          <p:nvPr/>
+        </p:nvPicPr>
+        <p:blipFill>
+          <a:blip r:embed="rId6"/>
+          <a:stretch>
+            <a:fillRect/>
+          </a:stretch>
+        </p:blipFill>
+        <p:spPr>
+          <a:xfrm>
+            <a:off x="6484566" y="2706131"/>
+            <a:ext cx="5199024" cy="3357575"/>
+          </a:xfrm>
+          <a:prstGeom prst="rect">
+            <a:avLst/>
+          </a:prstGeom>
+        </p:spPr>
+      </p:pic>
+    </p:spTree>
+    <p:extLst>
+      <p:ext uri="{BB962C8B-B14F-4D97-AF65-F5344CB8AC3E}">
+        <p14:creationId xmlns:p14="http://schemas.microsoft.com/office/powerpoint/2010/main" val="3147293165"/>
+      </p:ext>
+    </p:extLst>
+  </p:cSld>
+  <p:clrMapOvr>
+    <a:masterClrMapping/>
+  </p:clrMapOvr>
+</p:sld>
+</file>
+
+<file path=ppt/slides/slide7.xml><?xml version="1.0" encoding="utf-8"?>
+<p:sld xmlns:a="http://schemas.openxmlformats.org/drawingml/2006/main" xmlns:r="http://schemas.openxmlformats.org/officeDocument/2006/relationships" xmlns:p="http://schemas.openxmlformats.org/presentationml/2006/main">
+  <p:cSld>
+    <p:spTree>
+      <p:nvGrpSpPr>
+        <p:cNvPr id="1" name=""/>
+        <p:cNvGrpSpPr/>
+        <p:nvPr/>
+      </p:nvGrpSpPr>
+      <p:grpSpPr>
+        <a:xfrm>
+          <a:off x="0" y="0"/>
+          <a:ext cx="0" cy="0"/>
+          <a:chOff x="0" y="0"/>
+          <a:chExt cx="0" cy="0"/>
+        </a:xfrm>
+      </p:grpSpPr>
+      <p:pic>
+        <p:nvPicPr>
+          <p:cNvPr id="6" name="Picture 3" descr="Una red de puntos conectados">
+            <a:extLst>
+              <a:ext uri="{FF2B5EF4-FFF2-40B4-BE49-F238E27FC236}">
+                <a16:creationId xmlns:a16="http://schemas.microsoft.com/office/drawing/2014/main" id="{4EC5ED6C-92B5-57B7-9EC6-E40C78E878D0}"/>
+              </a:ext>
+            </a:extLst>
+          </p:cNvPr>
+          <p:cNvPicPr>
+            <a:picLocks noChangeAspect="1"/>
+          </p:cNvPicPr>
+          <p:nvPr/>
+        </p:nvPicPr>
+        <p:blipFill rotWithShape="1">
+          <a:blip r:embed="rId2">
+            <a:alphaModFix amt="20000"/>
+          </a:blip>
+          <a:srcRect l="20444" b="2030"/>
+          <a:stretch/>
+        </p:blipFill>
+        <p:spPr>
+          <a:xfrm>
+            <a:off x="163114" y="159505"/>
+            <a:ext cx="11865771" cy="6538989"/>
+          </a:xfrm>
+          <a:prstGeom prst="rect">
+            <a:avLst/>
+          </a:prstGeom>
+        </p:spPr>
+      </p:pic>
+      <p:sp>
+        <p:nvSpPr>
+          <p:cNvPr id="2" name="Título 1">
+            <a:extLst>
+              <a:ext uri="{FF2B5EF4-FFF2-40B4-BE49-F238E27FC236}">
+                <a16:creationId xmlns:a16="http://schemas.microsoft.com/office/drawing/2014/main" id="{AC62C56E-7B68-12F5-81B2-857F91BD8380}"/>
+              </a:ext>
+            </a:extLst>
+          </p:cNvPr>
+          <p:cNvSpPr>
+            <a:spLocks noGrp="1"/>
+          </p:cNvSpPr>
+          <p:nvPr>
+            <p:ph type="title"/>
+          </p:nvPr>
+        </p:nvSpPr>
+        <p:spPr>
+          <a:xfrm>
+            <a:off x="543726" y="519970"/>
+            <a:ext cx="10134600" cy="828675"/>
+          </a:xfrm>
+        </p:spPr>
+        <p:txBody>
+          <a:bodyPr>
+            <a:normAutofit/>
+          </a:bodyPr>
+          <a:lstStyle/>
+          <a:p>
+            <a:r>
+              <a:rPr lang="es-PE" sz="4400" dirty="0">
+                <a:solidFill>
+                  <a:schemeClr val="tx1"/>
+                </a:solidFill>
+              </a:rPr>
+              <a:t>5. RESNET MODEL</a:t>
+            </a:r>
+          </a:p>
+        </p:txBody>
+      </p:sp>
+      <p:pic>
+        <p:nvPicPr>
+          <p:cNvPr id="5" name="Marcador de contenido 4" descr="Un dibujo de un coral&#10;&#10;Descripción generada automáticamente con confianza baja">
+            <a:extLst>
+              <a:ext uri="{FF2B5EF4-FFF2-40B4-BE49-F238E27FC236}">
+                <a16:creationId xmlns:a16="http://schemas.microsoft.com/office/drawing/2014/main" id="{E3C00AE9-27E6-5665-8587-386367E3FBEE}"/>
+              </a:ext>
+            </a:extLst>
+          </p:cNvPr>
+          <p:cNvPicPr>
+            <a:picLocks noGrp="1" noChangeAspect="1"/>
+          </p:cNvPicPr>
+          <p:nvPr>
+            <p:ph idx="1"/>
+          </p:nvPr>
+        </p:nvPicPr>
+        <p:blipFill>
+          <a:blip r:embed="rId3">
+            <a:alphaModFix amt="50000"/>
+            <a:extLst>
+              <a:ext uri="{28A0092B-C50C-407E-A947-70E740481C1C}">
+                <a14:useLocalDpi xmlns:a14="http://schemas.microsoft.com/office/drawing/2010/main" val="0"/>
+              </a:ext>
+            </a:extLst>
+          </a:blip>
+          <a:stretch>
+            <a:fillRect/>
+          </a:stretch>
+        </p:blipFill>
+        <p:spPr>
+          <a:xfrm>
+            <a:off x="9406229" y="3890838"/>
+            <a:ext cx="2530878" cy="3129087"/>
+          </a:xfrm>
+        </p:spPr>
+      </p:pic>
+      <p:sp>
+        <p:nvSpPr>
+          <p:cNvPr id="16" name="CuadroTexto 15">
+            <a:extLst>
+              <a:ext uri="{FF2B5EF4-FFF2-40B4-BE49-F238E27FC236}">
+                <a16:creationId xmlns:a16="http://schemas.microsoft.com/office/drawing/2014/main" id="{90EB6D43-5F05-6D1B-1027-12C72286531F}"/>
+              </a:ext>
+            </a:extLst>
+          </p:cNvPr>
+          <p:cNvSpPr txBox="1"/>
+          <p:nvPr/>
+        </p:nvSpPr>
+        <p:spPr>
+          <a:xfrm>
+            <a:off x="647500" y="1536726"/>
+            <a:ext cx="10934477" cy="369332"/>
+          </a:xfrm>
+          <a:prstGeom prst="rect">
+            <a:avLst/>
+          </a:prstGeom>
+          <a:noFill/>
+        </p:spPr>
+        <p:txBody>
+          <a:bodyPr wrap="square" rtlCol="0">
+            <a:spAutoFit/>
+          </a:bodyPr>
+          <a:lstStyle/>
+          <a:p>
+            <a:r>
+              <a:rPr lang="es-PE" dirty="0" err="1"/>
+              <a:t>The</a:t>
+            </a:r>
+            <a:r>
+              <a:rPr lang="es-PE" dirty="0"/>
+              <a:t> </a:t>
+            </a:r>
+            <a:r>
+              <a:rPr lang="es-PE" dirty="0" err="1"/>
+              <a:t>Resnet</a:t>
+            </a:r>
+            <a:r>
+              <a:rPr lang="es-PE" dirty="0"/>
+              <a:t> </a:t>
+            </a:r>
+            <a:r>
+              <a:rPr lang="es-PE" dirty="0" err="1"/>
+              <a:t>model</a:t>
+            </a:r>
+            <a:r>
+              <a:rPr lang="es-PE" dirty="0"/>
+              <a:t> </a:t>
+            </a:r>
+            <a:r>
+              <a:rPr lang="es-PE" dirty="0" err="1"/>
+              <a:t>was</a:t>
+            </a:r>
+            <a:r>
+              <a:rPr lang="es-PE" dirty="0"/>
+              <a:t> </a:t>
+            </a:r>
+            <a:r>
+              <a:rPr lang="es-PE" dirty="0" err="1"/>
+              <a:t>created</a:t>
+            </a:r>
+            <a:r>
+              <a:rPr lang="es-PE" dirty="0"/>
+              <a:t> </a:t>
+            </a:r>
+            <a:r>
+              <a:rPr lang="es-PE" dirty="0" err="1"/>
+              <a:t>from</a:t>
+            </a:r>
+            <a:r>
+              <a:rPr lang="es-PE" dirty="0"/>
+              <a:t> </a:t>
+            </a:r>
+            <a:r>
+              <a:rPr lang="es-PE" dirty="0" err="1"/>
+              <a:t>scratch</a:t>
+            </a:r>
+            <a:r>
+              <a:rPr lang="es-PE" dirty="0"/>
+              <a:t> </a:t>
+            </a:r>
+            <a:r>
+              <a:rPr lang="es-PE" dirty="0" err="1"/>
+              <a:t>using</a:t>
+            </a:r>
+            <a:r>
+              <a:rPr lang="es-PE" dirty="0"/>
+              <a:t> </a:t>
+            </a:r>
+            <a:r>
+              <a:rPr lang="es-PE" dirty="0" err="1"/>
+              <a:t>pytorch</a:t>
+            </a:r>
+            <a:r>
+              <a:rPr lang="es-PE" dirty="0"/>
+              <a:t>, no </a:t>
+            </a:r>
+            <a:r>
+              <a:rPr lang="es-PE" dirty="0" err="1"/>
+              <a:t>pretrained</a:t>
+            </a:r>
+            <a:r>
+              <a:rPr lang="es-PE" dirty="0"/>
+              <a:t> </a:t>
+            </a:r>
+            <a:r>
+              <a:rPr lang="es-PE" dirty="0" err="1"/>
+              <a:t>model</a:t>
+            </a:r>
+            <a:r>
+              <a:rPr lang="es-PE" dirty="0"/>
+              <a:t> </a:t>
+            </a:r>
+            <a:r>
+              <a:rPr lang="es-PE" dirty="0" err="1"/>
+              <a:t>or</a:t>
+            </a:r>
+            <a:r>
+              <a:rPr lang="es-PE" dirty="0"/>
+              <a:t> </a:t>
+            </a:r>
+            <a:r>
+              <a:rPr lang="es-PE" dirty="0" err="1"/>
+              <a:t>downloaded</a:t>
+            </a:r>
+            <a:r>
+              <a:rPr lang="es-PE" dirty="0"/>
+              <a:t> </a:t>
+            </a:r>
+            <a:r>
+              <a:rPr lang="es-PE" dirty="0" err="1"/>
+              <a:t>model</a:t>
+            </a:r>
+            <a:r>
+              <a:rPr lang="es-PE" dirty="0"/>
+              <a:t> </a:t>
+            </a:r>
+            <a:r>
+              <a:rPr lang="es-PE" dirty="0" err="1"/>
+              <a:t>was</a:t>
+            </a:r>
+            <a:r>
+              <a:rPr lang="es-PE" dirty="0"/>
+              <a:t> </a:t>
+            </a:r>
+            <a:r>
+              <a:rPr lang="es-PE" dirty="0" err="1"/>
+              <a:t>used</a:t>
+            </a:r>
+            <a:r>
+              <a:rPr lang="es-PE" dirty="0"/>
+              <a:t> </a:t>
+            </a:r>
+            <a:r>
+              <a:rPr lang="es-PE" dirty="0" err="1"/>
+              <a:t>here</a:t>
+            </a:r>
+            <a:r>
+              <a:rPr lang="es-PE" dirty="0"/>
+              <a:t>.</a:t>
+            </a:r>
+          </a:p>
+        </p:txBody>
+      </p:sp>
+      <p:pic>
+        <p:nvPicPr>
+          <p:cNvPr id="4" name="Imagen 3">
+            <a:extLst>
+              <a:ext uri="{FF2B5EF4-FFF2-40B4-BE49-F238E27FC236}">
+                <a16:creationId xmlns:a16="http://schemas.microsoft.com/office/drawing/2014/main" id="{CD67965D-9F42-AC4A-0CD6-CFD7CE427F91}"/>
+              </a:ext>
+            </a:extLst>
+          </p:cNvPr>
+          <p:cNvPicPr>
+            <a:picLocks noChangeAspect="1"/>
+          </p:cNvPicPr>
+          <p:nvPr/>
+        </p:nvPicPr>
+        <p:blipFill>
+          <a:blip r:embed="rId4"/>
+          <a:stretch>
+            <a:fillRect/>
+          </a:stretch>
+        </p:blipFill>
+        <p:spPr>
+          <a:xfrm>
+            <a:off x="543726" y="2286000"/>
+            <a:ext cx="5199590" cy="3657600"/>
+          </a:xfrm>
+          <a:prstGeom prst="rect">
+            <a:avLst/>
+          </a:prstGeom>
+        </p:spPr>
+      </p:pic>
+      <p:pic>
+        <p:nvPicPr>
+          <p:cNvPr id="8" name="Imagen 7">
+            <a:extLst>
+              <a:ext uri="{FF2B5EF4-FFF2-40B4-BE49-F238E27FC236}">
+                <a16:creationId xmlns:a16="http://schemas.microsoft.com/office/drawing/2014/main" id="{8BCB6055-B308-8E38-4F48-295F5FBA395A}"/>
+              </a:ext>
+            </a:extLst>
+          </p:cNvPr>
+          <p:cNvPicPr>
+            <a:picLocks noChangeAspect="1"/>
+          </p:cNvPicPr>
+          <p:nvPr/>
+        </p:nvPicPr>
+        <p:blipFill>
+          <a:blip r:embed="rId5"/>
+          <a:stretch>
+            <a:fillRect/>
+          </a:stretch>
+        </p:blipFill>
+        <p:spPr>
+          <a:xfrm>
+            <a:off x="6017297" y="2286001"/>
+            <a:ext cx="5650824" cy="3657600"/>
+          </a:xfrm>
+          <a:prstGeom prst="rect">
+            <a:avLst/>
+          </a:prstGeom>
+        </p:spPr>
+      </p:pic>
+    </p:spTree>
+    <p:extLst>
+      <p:ext uri="{BB962C8B-B14F-4D97-AF65-F5344CB8AC3E}">
+        <p14:creationId xmlns:p14="http://schemas.microsoft.com/office/powerpoint/2010/main" val="3263898194"/>
+      </p:ext>
+    </p:extLst>
+  </p:cSld>
+  <p:clrMapOvr>
+    <a:masterClrMapping/>
+  </p:clrMapOvr>
+</p:sld>
+</file>
+
+<file path=ppt/slides/slide8.xml><?xml version="1.0" encoding="utf-8"?>
+<p:sld xmlns:a="http://schemas.openxmlformats.org/drawingml/2006/main" xmlns:r="http://schemas.openxmlformats.org/officeDocument/2006/relationships" xmlns:p="http://schemas.openxmlformats.org/presentationml/2006/main">
+  <p:cSld>
+    <p:spTree>
+      <p:nvGrpSpPr>
+        <p:cNvPr id="1" name=""/>
+        <p:cNvGrpSpPr/>
+        <p:nvPr/>
+      </p:nvGrpSpPr>
+      <p:grpSpPr>
+        <a:xfrm>
+          <a:off x="0" y="0"/>
+          <a:ext cx="0" cy="0"/>
+          <a:chOff x="0" y="0"/>
+          <a:chExt cx="0" cy="0"/>
+        </a:xfrm>
+      </p:grpSpPr>
+      <p:pic>
+        <p:nvPicPr>
+          <p:cNvPr id="6" name="Picture 3" descr="Una red de puntos conectados">
+            <a:extLst>
+              <a:ext uri="{FF2B5EF4-FFF2-40B4-BE49-F238E27FC236}">
+                <a16:creationId xmlns:a16="http://schemas.microsoft.com/office/drawing/2014/main" id="{4EC5ED6C-92B5-57B7-9EC6-E40C78E878D0}"/>
+              </a:ext>
+            </a:extLst>
+          </p:cNvPr>
+          <p:cNvPicPr>
+            <a:picLocks noChangeAspect="1"/>
+          </p:cNvPicPr>
+          <p:nvPr/>
+        </p:nvPicPr>
+        <p:blipFill rotWithShape="1">
+          <a:blip r:embed="rId2">
+            <a:alphaModFix amt="20000"/>
+          </a:blip>
+          <a:srcRect l="20444" b="2030"/>
+          <a:stretch/>
+        </p:blipFill>
+        <p:spPr>
+          <a:xfrm>
+            <a:off x="163114" y="159505"/>
+            <a:ext cx="11865771" cy="6538989"/>
+          </a:xfrm>
+          <a:prstGeom prst="rect">
+            <a:avLst/>
+          </a:prstGeom>
+        </p:spPr>
+      </p:pic>
+      <p:sp>
+        <p:nvSpPr>
+          <p:cNvPr id="2" name="Título 1">
+            <a:extLst>
+              <a:ext uri="{FF2B5EF4-FFF2-40B4-BE49-F238E27FC236}">
+                <a16:creationId xmlns:a16="http://schemas.microsoft.com/office/drawing/2014/main" id="{AC62C56E-7B68-12F5-81B2-857F91BD8380}"/>
+              </a:ext>
+            </a:extLst>
+          </p:cNvPr>
+          <p:cNvSpPr>
+            <a:spLocks noGrp="1"/>
+          </p:cNvSpPr>
+          <p:nvPr>
+            <p:ph type="title"/>
+          </p:nvPr>
+        </p:nvSpPr>
+        <p:spPr>
+          <a:xfrm>
+            <a:off x="537068" y="461115"/>
+            <a:ext cx="10134600" cy="828675"/>
+          </a:xfrm>
+        </p:spPr>
+        <p:txBody>
+          <a:bodyPr>
+            <a:normAutofit/>
+          </a:bodyPr>
+          <a:lstStyle/>
+          <a:p>
+            <a:r>
+              <a:rPr lang="es-PE" sz="4400" dirty="0">
+                <a:solidFill>
+                  <a:schemeClr val="tx1"/>
+                </a:solidFill>
+              </a:rPr>
+              <a:t>5.1 </a:t>
+            </a:r>
+            <a:r>
+              <a:rPr lang="es-PE" sz="4400" dirty="0" err="1">
+                <a:solidFill>
+                  <a:schemeClr val="tx1"/>
+                </a:solidFill>
+              </a:rPr>
+              <a:t>Results</a:t>
+            </a:r>
+            <a:endParaRPr lang="es-PE" sz="4400" dirty="0">
+              <a:solidFill>
+                <a:schemeClr val="tx1"/>
+              </a:solidFill>
+            </a:endParaRPr>
+          </a:p>
+        </p:txBody>
+      </p:sp>
+      <p:pic>
+        <p:nvPicPr>
+          <p:cNvPr id="5" name="Marcador de contenido 4" descr="Un dibujo de un coral&#10;&#10;Descripción generada automáticamente con confianza baja">
+            <a:extLst>
+              <a:ext uri="{FF2B5EF4-FFF2-40B4-BE49-F238E27FC236}">
+                <a16:creationId xmlns:a16="http://schemas.microsoft.com/office/drawing/2014/main" id="{E3C00AE9-27E6-5665-8587-386367E3FBEE}"/>
+              </a:ext>
+            </a:extLst>
+          </p:cNvPr>
+          <p:cNvPicPr>
+            <a:picLocks noGrp="1" noChangeAspect="1"/>
+          </p:cNvPicPr>
+          <p:nvPr>
+            <p:ph idx="1"/>
+          </p:nvPr>
+        </p:nvPicPr>
+        <p:blipFill>
+          <a:blip r:embed="rId3">
+            <a:alphaModFix amt="50000"/>
+            <a:extLst>
+              <a:ext uri="{28A0092B-C50C-407E-A947-70E740481C1C}">
+                <a14:useLocalDpi xmlns:a14="http://schemas.microsoft.com/office/drawing/2010/main" val="0"/>
+              </a:ext>
+            </a:extLst>
+          </a:blip>
+          <a:stretch>
+            <a:fillRect/>
+          </a:stretch>
+        </p:blipFill>
+        <p:spPr>
+          <a:xfrm>
+            <a:off x="9406229" y="3890838"/>
+            <a:ext cx="2530878" cy="3129087"/>
+          </a:xfrm>
+        </p:spPr>
+      </p:pic>
+      <p:pic>
+        <p:nvPicPr>
+          <p:cNvPr id="4" name="Imagen 3" descr="Histograma&#10;&#10;Descripción generada automáticamente">
+            <a:extLst>
+              <a:ext uri="{FF2B5EF4-FFF2-40B4-BE49-F238E27FC236}">
+                <a16:creationId xmlns:a16="http://schemas.microsoft.com/office/drawing/2014/main" id="{AA35957A-8527-3DF2-40F7-283471DBCE47}"/>
+              </a:ext>
+            </a:extLst>
+          </p:cNvPr>
+          <p:cNvPicPr>
+            <a:picLocks noChangeAspect="1"/>
+          </p:cNvPicPr>
+          <p:nvPr/>
+        </p:nvPicPr>
+        <p:blipFill rotWithShape="1">
+          <a:blip r:embed="rId4">
+            <a:extLst>
+              <a:ext uri="{28A0092B-C50C-407E-A947-70E740481C1C}">
+                <a14:useLocalDpi xmlns:a14="http://schemas.microsoft.com/office/drawing/2010/main" val="0"/>
+              </a:ext>
+            </a:extLst>
+          </a:blip>
+          <a:srcRect l="1291" t="9580" r="8240" b="4832"/>
+          <a:stretch/>
+        </p:blipFill>
+        <p:spPr>
+          <a:xfrm>
+            <a:off x="695887" y="1915919"/>
+            <a:ext cx="5187532" cy="3680732"/>
+          </a:xfrm>
+          <a:prstGeom prst="rect">
+            <a:avLst/>
+          </a:prstGeom>
+        </p:spPr>
+      </p:pic>
+      <p:pic>
+        <p:nvPicPr>
+          <p:cNvPr id="10" name="Imagen 9" descr="Texto&#10;&#10;Descripción generada automáticamente">
+            <a:extLst>
+              <a:ext uri="{FF2B5EF4-FFF2-40B4-BE49-F238E27FC236}">
+                <a16:creationId xmlns:a16="http://schemas.microsoft.com/office/drawing/2014/main" id="{95972996-295B-CEFB-6C34-2BD962A7DA16}"/>
+              </a:ext>
+            </a:extLst>
+          </p:cNvPr>
+          <p:cNvPicPr>
+            <a:picLocks noChangeAspect="1"/>
+          </p:cNvPicPr>
+          <p:nvPr/>
+        </p:nvPicPr>
+        <p:blipFill>
+          <a:blip r:embed="rId5">
+            <a:extLst>
+              <a:ext uri="{28A0092B-C50C-407E-A947-70E740481C1C}">
+                <a14:useLocalDpi xmlns:a14="http://schemas.microsoft.com/office/drawing/2010/main" val="0"/>
+              </a:ext>
+            </a:extLst>
+          </a:blip>
+          <a:stretch>
+            <a:fillRect/>
+          </a:stretch>
+        </p:blipFill>
+        <p:spPr>
+          <a:xfrm>
+            <a:off x="6206996" y="1364434"/>
+            <a:ext cx="5174528" cy="4783702"/>
+          </a:xfrm>
+          <a:prstGeom prst="rect">
+            <a:avLst/>
+          </a:prstGeom>
+        </p:spPr>
+      </p:pic>
+    </p:spTree>
+    <p:extLst>
+      <p:ext uri="{BB962C8B-B14F-4D97-AF65-F5344CB8AC3E}">
+        <p14:creationId xmlns:p14="http://schemas.microsoft.com/office/powerpoint/2010/main" val="4264514977"/>
+      </p:ext>
+    </p:extLst>
+  </p:cSld>
+  <p:clrMapOvr>
+    <a:masterClrMapping/>
+  </p:clrMapOvr>
+</p:sld>
+</file>
+
+<file path=ppt/slides/slide9.xml><?xml version="1.0" encoding="utf-8"?>
+<p:sld xmlns:a="http://schemas.openxmlformats.org/drawingml/2006/main" xmlns:r="http://schemas.openxmlformats.org/officeDocument/2006/relationships" xmlns:p="http://schemas.openxmlformats.org/presentationml/2006/main">
+  <p:cSld>
+    <p:spTree>
+      <p:nvGrpSpPr>
+        <p:cNvPr id="1" name=""/>
+        <p:cNvGrpSpPr/>
+        <p:nvPr/>
+      </p:nvGrpSpPr>
+      <p:grpSpPr>
+        <a:xfrm>
+          <a:off x="0" y="0"/>
+          <a:ext cx="0" cy="0"/>
+          <a:chOff x="0" y="0"/>
+          <a:chExt cx="0" cy="0"/>
+        </a:xfrm>
+      </p:grpSpPr>
+      <p:pic>
+        <p:nvPicPr>
+          <p:cNvPr id="6" name="Picture 3" descr="Una red de puntos conectados">
+            <a:extLst>
+              <a:ext uri="{FF2B5EF4-FFF2-40B4-BE49-F238E27FC236}">
+                <a16:creationId xmlns:a16="http://schemas.microsoft.com/office/drawing/2014/main" id="{4EC5ED6C-92B5-57B7-9EC6-E40C78E878D0}"/>
+              </a:ext>
+            </a:extLst>
+          </p:cNvPr>
+          <p:cNvPicPr>
+            <a:picLocks noChangeAspect="1"/>
+          </p:cNvPicPr>
+          <p:nvPr/>
+        </p:nvPicPr>
+        <p:blipFill rotWithShape="1">
+          <a:blip r:embed="rId2">
+            <a:alphaModFix amt="20000"/>
+          </a:blip>
+          <a:srcRect l="20444" b="2030"/>
+          <a:stretch/>
+        </p:blipFill>
+        <p:spPr>
+          <a:xfrm>
+            <a:off x="163114" y="159505"/>
+            <a:ext cx="11865771" cy="6538989"/>
+          </a:xfrm>
+          <a:prstGeom prst="rect">
+            <a:avLst/>
+          </a:prstGeom>
+        </p:spPr>
+      </p:pic>
+      <p:sp>
+        <p:nvSpPr>
+          <p:cNvPr id="2" name="Título 1">
+            <a:extLst>
+              <a:ext uri="{FF2B5EF4-FFF2-40B4-BE49-F238E27FC236}">
+                <a16:creationId xmlns:a16="http://schemas.microsoft.com/office/drawing/2014/main" id="{AC62C56E-7B68-12F5-81B2-857F91BD8380}"/>
+              </a:ext>
+            </a:extLst>
+          </p:cNvPr>
+          <p:cNvSpPr>
+            <a:spLocks noGrp="1"/>
+          </p:cNvSpPr>
+          <p:nvPr>
+            <p:ph type="title"/>
+          </p:nvPr>
+        </p:nvSpPr>
+        <p:spPr>
+          <a:xfrm>
+            <a:off x="537068" y="461115"/>
+            <a:ext cx="10134600" cy="828675"/>
+          </a:xfrm>
+        </p:spPr>
+        <p:txBody>
+          <a:bodyPr>
+            <a:normAutofit/>
+          </a:bodyPr>
+          <a:lstStyle/>
+          <a:p>
+            <a:r>
+              <a:rPr lang="es-PE" sz="4400" dirty="0">
+                <a:solidFill>
+                  <a:schemeClr val="tx1"/>
+                </a:solidFill>
+              </a:rPr>
+              <a:t>5.1 </a:t>
+            </a:r>
+            <a:r>
+              <a:rPr lang="es-PE" sz="4400" dirty="0" err="1">
+                <a:solidFill>
+                  <a:schemeClr val="tx1"/>
+                </a:solidFill>
+              </a:rPr>
+              <a:t>Results</a:t>
+            </a:r>
+            <a:endParaRPr lang="es-PE" sz="4400" dirty="0">
+              <a:solidFill>
+                <a:schemeClr val="tx1"/>
+              </a:solidFill>
+            </a:endParaRPr>
+          </a:p>
+        </p:txBody>
+      </p:sp>
+      <p:pic>
+        <p:nvPicPr>
+          <p:cNvPr id="5" name="Marcador de contenido 4" descr="Un dibujo de un coral&#10;&#10;Descripción generada automáticamente con confianza baja">
+            <a:extLst>
+              <a:ext uri="{FF2B5EF4-FFF2-40B4-BE49-F238E27FC236}">
+                <a16:creationId xmlns:a16="http://schemas.microsoft.com/office/drawing/2014/main" id="{E3C00AE9-27E6-5665-8587-386367E3FBEE}"/>
+              </a:ext>
+            </a:extLst>
+          </p:cNvPr>
+          <p:cNvPicPr>
+            <a:picLocks noGrp="1" noChangeAspect="1"/>
+          </p:cNvPicPr>
+          <p:nvPr>
+            <p:ph idx="1"/>
+          </p:nvPr>
+        </p:nvPicPr>
+        <p:blipFill>
+          <a:blip r:embed="rId3">
+            <a:alphaModFix amt="50000"/>
+            <a:extLst>
+              <a:ext uri="{28A0092B-C50C-407E-A947-70E740481C1C}">
+                <a14:useLocalDpi xmlns:a14="http://schemas.microsoft.com/office/drawing/2010/main" val="0"/>
+              </a:ext>
+            </a:extLst>
+          </a:blip>
+          <a:stretch>
+            <a:fillRect/>
+          </a:stretch>
+        </p:blipFill>
+        <p:spPr>
+          <a:xfrm>
+            <a:off x="9406229" y="3890838"/>
+            <a:ext cx="2530878" cy="3129087"/>
+          </a:xfrm>
+        </p:spPr>
+      </p:pic>
+      <p:pic>
+        <p:nvPicPr>
+          <p:cNvPr id="4" name="Imagen 3">
+            <a:extLst>
+              <a:ext uri="{FF2B5EF4-FFF2-40B4-BE49-F238E27FC236}">
+                <a16:creationId xmlns:a16="http://schemas.microsoft.com/office/drawing/2014/main" id="{2F82785C-17A4-68DB-7A7E-78F97BA94830}"/>
+              </a:ext>
+            </a:extLst>
+          </p:cNvPr>
+          <p:cNvPicPr>
+            <a:picLocks noChangeAspect="1"/>
+          </p:cNvPicPr>
+          <p:nvPr/>
+        </p:nvPicPr>
+        <p:blipFill>
+          <a:blip r:embed="rId4"/>
+          <a:stretch>
+            <a:fillRect/>
+          </a:stretch>
+        </p:blipFill>
+        <p:spPr>
+          <a:xfrm>
+            <a:off x="3008783" y="1228583"/>
+            <a:ext cx="6174431" cy="5324510"/>
+          </a:xfrm>
+          <a:prstGeom prst="rect">
+            <a:avLst/>
+          </a:prstGeom>
+        </p:spPr>
+      </p:pic>
+    </p:spTree>
+    <p:extLst>
+      <p:ext uri="{BB962C8B-B14F-4D97-AF65-F5344CB8AC3E}">
+        <p14:creationId xmlns:p14="http://schemas.microsoft.com/office/powerpoint/2010/main" val="920251701"/>
       </p:ext>
     </p:extLst>
   </p:cSld>

</xml_diff>